<commit_message>
added image explanation in English
</commit_message>
<xml_diff>
--- a/CaseStudy/BusinessFlow/BusinessFlow-IT.pptx
+++ b/CaseStudy/BusinessFlow/BusinessFlow-IT.pptx
@@ -6,7 +6,8 @@
   </p:sldMasterIdLst>
   <p:sldIdLst>
     <p:sldId id="257" r:id="rId2"/>
-    <p:sldId id="302" r:id="rId3"/>
+    <p:sldId id="258" r:id="rId3"/>
+    <p:sldId id="302" r:id="rId4"/>
   </p:sldIdLst>
   <p:sldSz cx="9144000" cy="6858000" type="screen4x3"/>
   <p:notesSz cx="6858000" cy="9144000"/>
@@ -303,7 +304,7 @@
           <a:p>
             <a:fld id="{363C93A5-AB31-4885-A4FA-4F94D9533BAB}" type="datetimeFigureOut">
               <a:rPr kumimoji="1" lang="ja-JP" altLang="en-US" smtClean="0"/>
-              <a:t>2018/10/26</a:t>
+              <a:t>2018/11/12</a:t>
             </a:fld>
             <a:endParaRPr kumimoji="1" lang="ja-JP" altLang="en-US"/>
           </a:p>
@@ -503,7 +504,7 @@
           <a:p>
             <a:fld id="{363C93A5-AB31-4885-A4FA-4F94D9533BAB}" type="datetimeFigureOut">
               <a:rPr kumimoji="1" lang="ja-JP" altLang="en-US" smtClean="0"/>
-              <a:t>2018/10/26</a:t>
+              <a:t>2018/11/12</a:t>
             </a:fld>
             <a:endParaRPr kumimoji="1" lang="ja-JP" altLang="en-US"/>
           </a:p>
@@ -713,7 +714,7 @@
           <a:p>
             <a:fld id="{363C93A5-AB31-4885-A4FA-4F94D9533BAB}" type="datetimeFigureOut">
               <a:rPr kumimoji="1" lang="ja-JP" altLang="en-US" smtClean="0"/>
-              <a:t>2018/10/26</a:t>
+              <a:t>2018/11/12</a:t>
             </a:fld>
             <a:endParaRPr kumimoji="1" lang="ja-JP" altLang="en-US"/>
           </a:p>
@@ -913,7 +914,7 @@
           <a:p>
             <a:fld id="{363C93A5-AB31-4885-A4FA-4F94D9533BAB}" type="datetimeFigureOut">
               <a:rPr kumimoji="1" lang="ja-JP" altLang="en-US" smtClean="0"/>
-              <a:t>2018/10/26</a:t>
+              <a:t>2018/11/12</a:t>
             </a:fld>
             <a:endParaRPr kumimoji="1" lang="ja-JP" altLang="en-US"/>
           </a:p>
@@ -1158,7 +1159,7 @@
           <a:p>
             <a:fld id="{363C93A5-AB31-4885-A4FA-4F94D9533BAB}" type="datetimeFigureOut">
               <a:rPr kumimoji="1" lang="ja-JP" altLang="en-US" smtClean="0"/>
-              <a:t>2018/10/26</a:t>
+              <a:t>2018/11/12</a:t>
             </a:fld>
             <a:endParaRPr kumimoji="1" lang="ja-JP" altLang="en-US"/>
           </a:p>
@@ -1507,7 +1508,7 @@
           <a:p>
             <a:fld id="{363C93A5-AB31-4885-A4FA-4F94D9533BAB}" type="datetimeFigureOut">
               <a:rPr kumimoji="1" lang="ja-JP" altLang="en-US" smtClean="0"/>
-              <a:t>2018/10/26</a:t>
+              <a:t>2018/11/12</a:t>
             </a:fld>
             <a:endParaRPr kumimoji="1" lang="ja-JP" altLang="en-US"/>
           </a:p>
@@ -1990,7 +1991,7 @@
           <a:p>
             <a:fld id="{363C93A5-AB31-4885-A4FA-4F94D9533BAB}" type="datetimeFigureOut">
               <a:rPr kumimoji="1" lang="ja-JP" altLang="en-US" smtClean="0"/>
-              <a:t>2018/10/26</a:t>
+              <a:t>2018/11/12</a:t>
             </a:fld>
             <a:endParaRPr kumimoji="1" lang="ja-JP" altLang="en-US"/>
           </a:p>
@@ -2107,7 +2108,7 @@
           <a:p>
             <a:fld id="{363C93A5-AB31-4885-A4FA-4F94D9533BAB}" type="datetimeFigureOut">
               <a:rPr kumimoji="1" lang="ja-JP" altLang="en-US" smtClean="0"/>
-              <a:t>2018/10/26</a:t>
+              <a:t>2018/11/12</a:t>
             </a:fld>
             <a:endParaRPr kumimoji="1" lang="ja-JP" altLang="en-US"/>
           </a:p>
@@ -2202,7 +2203,7 @@
           <a:p>
             <a:fld id="{363C93A5-AB31-4885-A4FA-4F94D9533BAB}" type="datetimeFigureOut">
               <a:rPr kumimoji="1" lang="ja-JP" altLang="en-US" smtClean="0"/>
-              <a:t>2018/10/26</a:t>
+              <a:t>2018/11/12</a:t>
             </a:fld>
             <a:endParaRPr kumimoji="1" lang="ja-JP" altLang="en-US"/>
           </a:p>
@@ -2509,7 +2510,7 @@
           <a:p>
             <a:fld id="{363C93A5-AB31-4885-A4FA-4F94D9533BAB}" type="datetimeFigureOut">
               <a:rPr kumimoji="1" lang="ja-JP" altLang="en-US" smtClean="0"/>
-              <a:t>2018/10/26</a:t>
+              <a:t>2018/11/12</a:t>
             </a:fld>
             <a:endParaRPr kumimoji="1" lang="ja-JP" altLang="en-US"/>
           </a:p>
@@ -2761,7 +2762,7 @@
           <a:p>
             <a:fld id="{363C93A5-AB31-4885-A4FA-4F94D9533BAB}" type="datetimeFigureOut">
               <a:rPr kumimoji="1" lang="ja-JP" altLang="en-US" smtClean="0"/>
-              <a:t>2018/10/26</a:t>
+              <a:t>2018/11/12</a:t>
             </a:fld>
             <a:endParaRPr kumimoji="1" lang="ja-JP" altLang="en-US"/>
           </a:p>
@@ -3004,7 +3005,7 @@
           <a:p>
             <a:fld id="{363C93A5-AB31-4885-A4FA-4F94D9533BAB}" type="datetimeFigureOut">
               <a:rPr kumimoji="1" lang="ja-JP" altLang="en-US" smtClean="0"/>
-              <a:t>2018/10/26</a:t>
+              <a:t>2018/11/12</a:t>
             </a:fld>
             <a:endParaRPr kumimoji="1" lang="ja-JP" altLang="en-US"/>
           </a:p>
@@ -6155,6 +6156,3349 @@
 </file>
 
 <file path=ppt/slides/slide2.xml><?xml version="1.0" encoding="utf-8"?>
+<p:sld xmlns:a="http://schemas.openxmlformats.org/drawingml/2006/main" xmlns:r="http://schemas.openxmlformats.org/officeDocument/2006/relationships" xmlns:p="http://schemas.openxmlformats.org/presentationml/2006/main">
+  <p:cSld>
+    <p:spTree>
+      <p:nvGrpSpPr>
+        <p:cNvPr id="1" name=""/>
+        <p:cNvGrpSpPr/>
+        <p:nvPr/>
+      </p:nvGrpSpPr>
+      <p:grpSpPr>
+        <a:xfrm>
+          <a:off x="0" y="0"/>
+          <a:ext cx="0" cy="0"/>
+          <a:chOff x="0" y="0"/>
+          <a:chExt cx="0" cy="0"/>
+        </a:xfrm>
+      </p:grpSpPr>
+      <p:sp>
+        <p:nvSpPr>
+          <p:cNvPr id="2" name="フッター プレースホルダー 1"/>
+          <p:cNvSpPr>
+            <a:spLocks noGrp="1"/>
+          </p:cNvSpPr>
+          <p:nvPr>
+            <p:ph type="ftr" sz="quarter" idx="11"/>
+          </p:nvPr>
+        </p:nvSpPr>
+        <p:spPr>
+          <a:xfrm>
+            <a:off x="3124200" y="6520259"/>
+            <a:ext cx="2895600" cy="365125"/>
+          </a:xfrm>
+        </p:spPr>
+        <p:txBody>
+          <a:bodyPr/>
+          <a:lstStyle/>
+          <a:p>
+            <a:r>
+              <a:rPr kumimoji="1" lang="en-US" altLang="ja-JP"/>
+              <a:t>CC0-1.0</a:t>
+            </a:r>
+            <a:endParaRPr kumimoji="1" lang="ja-JP" altLang="en-US" dirty="0"/>
+          </a:p>
+        </p:txBody>
+      </p:sp>
+      <p:grpSp>
+        <p:nvGrpSpPr>
+          <p:cNvPr id="11" name="グループ化 10">
+            <a:extLst>
+              <a:ext uri="{FF2B5EF4-FFF2-40B4-BE49-F238E27FC236}">
+                <a16:creationId xmlns:a16="http://schemas.microsoft.com/office/drawing/2014/main" id="{075BB555-A52C-4E85-BD05-486E55FB03BC}"/>
+              </a:ext>
+            </a:extLst>
+          </p:cNvPr>
+          <p:cNvGrpSpPr/>
+          <p:nvPr/>
+        </p:nvGrpSpPr>
+        <p:grpSpPr>
+          <a:xfrm>
+            <a:off x="301525" y="404665"/>
+            <a:ext cx="8734971" cy="1568799"/>
+            <a:chOff x="301525" y="404665"/>
+            <a:chExt cx="8734971" cy="1568799"/>
+          </a:xfrm>
+        </p:grpSpPr>
+        <p:sp>
+          <p:nvSpPr>
+            <p:cNvPr id="3" name="四角形: 角を丸くする 2"/>
+            <p:cNvSpPr/>
+            <p:nvPr/>
+          </p:nvSpPr>
+          <p:spPr>
+            <a:xfrm>
+              <a:off x="1913184" y="404665"/>
+              <a:ext cx="5539135" cy="1064032"/>
+            </a:xfrm>
+            <a:prstGeom prst="roundRect">
+              <a:avLst/>
+            </a:prstGeom>
+            <a:solidFill>
+              <a:schemeClr val="accent1">
+                <a:lumMod val="60000"/>
+                <a:lumOff val="40000"/>
+              </a:schemeClr>
+            </a:solidFill>
+          </p:spPr>
+          <p:style>
+            <a:lnRef idx="2">
+              <a:schemeClr val="accent1">
+                <a:shade val="50000"/>
+              </a:schemeClr>
+            </a:lnRef>
+            <a:fillRef idx="1">
+              <a:schemeClr val="accent1"/>
+            </a:fillRef>
+            <a:effectRef idx="0">
+              <a:schemeClr val="accent1"/>
+            </a:effectRef>
+            <a:fontRef idx="minor">
+              <a:schemeClr val="lt1"/>
+            </a:fontRef>
+          </p:style>
+          <p:txBody>
+            <a:bodyPr rtlCol="0" anchor="ctr"/>
+            <a:lstStyle/>
+            <a:p>
+              <a:pPr algn="ctr"/>
+              <a:endParaRPr kumimoji="1" lang="ja-JP" altLang="en-US" sz="1400"/>
+            </a:p>
+          </p:txBody>
+        </p:sp>
+        <p:sp>
+          <p:nvSpPr>
+            <p:cNvPr id="4" name="テキスト ボックス 3"/>
+            <p:cNvSpPr txBox="1"/>
+            <p:nvPr/>
+          </p:nvSpPr>
+          <p:spPr>
+            <a:xfrm>
+              <a:off x="301525" y="692696"/>
+              <a:ext cx="1177331" cy="369332"/>
+            </a:xfrm>
+            <a:prstGeom prst="rect">
+              <a:avLst/>
+            </a:prstGeom>
+            <a:noFill/>
+          </p:spPr>
+          <p:txBody>
+            <a:bodyPr wrap="square" rtlCol="0">
+              <a:spAutoFit/>
+            </a:bodyPr>
+            <a:lstStyle/>
+            <a:p>
+              <a:r>
+                <a:rPr kumimoji="1" lang="en-US" altLang="ja-JP" dirty="0"/>
+                <a:t>IT-1</a:t>
+              </a:r>
+              <a:endParaRPr kumimoji="1" lang="ja-JP" altLang="en-US" dirty="0"/>
+            </a:p>
+          </p:txBody>
+        </p:sp>
+        <p:sp>
+          <p:nvSpPr>
+            <p:cNvPr id="8" name="四角形: 角を丸くする 7"/>
+            <p:cNvSpPr/>
+            <p:nvPr/>
+          </p:nvSpPr>
+          <p:spPr>
+            <a:xfrm>
+              <a:off x="2195736" y="497731"/>
+              <a:ext cx="1665435" cy="779050"/>
+            </a:xfrm>
+            <a:prstGeom prst="roundRect">
+              <a:avLst/>
+            </a:prstGeom>
+            <a:solidFill>
+              <a:srgbClr val="FFFF00"/>
+            </a:solidFill>
+          </p:spPr>
+          <p:style>
+            <a:lnRef idx="2">
+              <a:schemeClr val="accent1">
+                <a:shade val="50000"/>
+              </a:schemeClr>
+            </a:lnRef>
+            <a:fillRef idx="1">
+              <a:schemeClr val="accent1"/>
+            </a:fillRef>
+            <a:effectRef idx="0">
+              <a:schemeClr val="accent1"/>
+            </a:effectRef>
+            <a:fontRef idx="minor">
+              <a:schemeClr val="lt1"/>
+            </a:fontRef>
+          </p:style>
+          <p:txBody>
+            <a:bodyPr rtlCol="0" anchor="ctr"/>
+            <a:lstStyle/>
+            <a:p>
+              <a:pPr algn="ctr"/>
+              <a:r>
+                <a:rPr lang="en-US" altLang="ja-JP" sz="1400" dirty="0">
+                  <a:solidFill>
+                    <a:schemeClr val="tx1"/>
+                  </a:solidFill>
+                </a:rPr>
+                <a:t>Planning/</a:t>
+              </a:r>
+            </a:p>
+            <a:p>
+              <a:pPr algn="ctr"/>
+              <a:r>
+                <a:rPr lang="en-US" altLang="ja-JP" sz="1400" dirty="0">
+                  <a:solidFill>
+                    <a:schemeClr val="tx1"/>
+                  </a:solidFill>
+                </a:rPr>
+                <a:t>development</a:t>
+              </a:r>
+              <a:endParaRPr kumimoji="1" lang="ja-JP" altLang="en-US" sz="1400" dirty="0">
+                <a:solidFill>
+                  <a:schemeClr val="tx1"/>
+                </a:solidFill>
+              </a:endParaRPr>
+            </a:p>
+          </p:txBody>
+        </p:sp>
+        <p:cxnSp>
+          <p:nvCxnSpPr>
+            <p:cNvPr id="13" name="直線矢印コネクタ 12"/>
+            <p:cNvCxnSpPr>
+              <a:cxnSpLocks/>
+              <a:stCxn id="8" idx="3"/>
+              <a:endCxn id="53" idx="1"/>
+            </p:cNvCxnSpPr>
+            <p:nvPr/>
+          </p:nvCxnSpPr>
+          <p:spPr>
+            <a:xfrm flipV="1">
+              <a:off x="3861171" y="883196"/>
+              <a:ext cx="566813" cy="4060"/>
+            </a:xfrm>
+            <a:prstGeom prst="straightConnector1">
+              <a:avLst/>
+            </a:prstGeom>
+            <a:ln w="38100">
+              <a:solidFill>
+                <a:schemeClr val="tx1"/>
+              </a:solidFill>
+              <a:tailEnd type="triangle"/>
+            </a:ln>
+          </p:spPr>
+          <p:style>
+            <a:lnRef idx="1">
+              <a:schemeClr val="accent1"/>
+            </a:lnRef>
+            <a:fillRef idx="0">
+              <a:schemeClr val="accent1"/>
+            </a:fillRef>
+            <a:effectRef idx="0">
+              <a:schemeClr val="accent1"/>
+            </a:effectRef>
+            <a:fontRef idx="minor">
+              <a:schemeClr val="tx1"/>
+            </a:fontRef>
+          </p:style>
+        </p:cxnSp>
+        <p:sp>
+          <p:nvSpPr>
+            <p:cNvPr id="53" name="四角形: 角を丸くする 52"/>
+            <p:cNvSpPr/>
+            <p:nvPr/>
+          </p:nvSpPr>
+          <p:spPr>
+            <a:xfrm>
+              <a:off x="4427984" y="692696"/>
+              <a:ext cx="1163091" cy="381000"/>
+            </a:xfrm>
+            <a:prstGeom prst="roundRect">
+              <a:avLst/>
+            </a:prstGeom>
+            <a:solidFill>
+              <a:srgbClr val="FFFF00"/>
+            </a:solidFill>
+          </p:spPr>
+          <p:style>
+            <a:lnRef idx="2">
+              <a:schemeClr val="accent1">
+                <a:shade val="50000"/>
+              </a:schemeClr>
+            </a:lnRef>
+            <a:fillRef idx="1">
+              <a:schemeClr val="accent1"/>
+            </a:fillRef>
+            <a:effectRef idx="0">
+              <a:schemeClr val="accent1"/>
+            </a:effectRef>
+            <a:fontRef idx="minor">
+              <a:schemeClr val="lt1"/>
+            </a:fontRef>
+          </p:style>
+          <p:txBody>
+            <a:bodyPr rtlCol="0" anchor="ctr"/>
+            <a:lstStyle/>
+            <a:p>
+              <a:pPr algn="ctr"/>
+              <a:r>
+                <a:rPr lang="en-US" altLang="ja-JP" sz="1400" dirty="0">
+                  <a:solidFill>
+                    <a:schemeClr val="tx1"/>
+                  </a:solidFill>
+                </a:rPr>
+                <a:t>Verification</a:t>
+              </a:r>
+              <a:endParaRPr kumimoji="1" lang="ja-JP" altLang="en-US" sz="1400" dirty="0">
+                <a:solidFill>
+                  <a:schemeClr val="tx1"/>
+                </a:solidFill>
+              </a:endParaRPr>
+            </a:p>
+          </p:txBody>
+        </p:sp>
+        <p:cxnSp>
+          <p:nvCxnSpPr>
+            <p:cNvPr id="55" name="直線矢印コネクタ 54"/>
+            <p:cNvCxnSpPr>
+              <a:stCxn id="53" idx="3"/>
+            </p:cNvCxnSpPr>
+            <p:nvPr/>
+          </p:nvCxnSpPr>
+          <p:spPr>
+            <a:xfrm>
+              <a:off x="5591075" y="883196"/>
+              <a:ext cx="482129" cy="0"/>
+            </a:xfrm>
+            <a:prstGeom prst="straightConnector1">
+              <a:avLst/>
+            </a:prstGeom>
+            <a:ln w="38100">
+              <a:solidFill>
+                <a:schemeClr val="tx1"/>
+              </a:solidFill>
+              <a:tailEnd type="triangle"/>
+            </a:ln>
+          </p:spPr>
+          <p:style>
+            <a:lnRef idx="1">
+              <a:schemeClr val="accent1"/>
+            </a:lnRef>
+            <a:fillRef idx="0">
+              <a:schemeClr val="accent1"/>
+            </a:fillRef>
+            <a:effectRef idx="0">
+              <a:schemeClr val="accent1"/>
+            </a:effectRef>
+            <a:fontRef idx="minor">
+              <a:schemeClr val="tx1"/>
+            </a:fontRef>
+          </p:style>
+        </p:cxnSp>
+        <p:sp>
+          <p:nvSpPr>
+            <p:cNvPr id="49" name="四角形: 角を丸くする 48"/>
+            <p:cNvSpPr/>
+            <p:nvPr/>
+          </p:nvSpPr>
+          <p:spPr>
+            <a:xfrm>
+              <a:off x="2411760" y="1535832"/>
+              <a:ext cx="1163091" cy="381000"/>
+            </a:xfrm>
+            <a:prstGeom prst="roundRect">
+              <a:avLst/>
+            </a:prstGeom>
+            <a:solidFill>
+              <a:schemeClr val="accent3">
+                <a:lumMod val="50000"/>
+              </a:schemeClr>
+            </a:solidFill>
+            <a:ln>
+              <a:solidFill>
+                <a:schemeClr val="accent3">
+                  <a:lumMod val="50000"/>
+                </a:schemeClr>
+              </a:solidFill>
+            </a:ln>
+          </p:spPr>
+          <p:style>
+            <a:lnRef idx="2">
+              <a:schemeClr val="accent1">
+                <a:shade val="50000"/>
+              </a:schemeClr>
+            </a:lnRef>
+            <a:fillRef idx="1">
+              <a:schemeClr val="accent1"/>
+            </a:fillRef>
+            <a:effectRef idx="0">
+              <a:schemeClr val="accent1"/>
+            </a:effectRef>
+            <a:fontRef idx="minor">
+              <a:schemeClr val="lt1"/>
+            </a:fontRef>
+          </p:style>
+          <p:txBody>
+            <a:bodyPr rtlCol="0" anchor="ctr"/>
+            <a:lstStyle/>
+            <a:p>
+              <a:pPr algn="ctr"/>
+              <a:r>
+                <a:rPr lang="en-US" altLang="ja-JP" sz="1400" dirty="0">
+                  <a:solidFill>
+                    <a:schemeClr val="bg1"/>
+                  </a:solidFill>
+                </a:rPr>
+                <a:t>Community</a:t>
+              </a:r>
+              <a:endParaRPr kumimoji="1" lang="ja-JP" altLang="en-US" sz="1400" dirty="0">
+                <a:solidFill>
+                  <a:schemeClr val="bg1"/>
+                </a:solidFill>
+              </a:endParaRPr>
+            </a:p>
+          </p:txBody>
+        </p:sp>
+        <p:cxnSp>
+          <p:nvCxnSpPr>
+            <p:cNvPr id="51" name="直線矢印コネクタ 50"/>
+            <p:cNvCxnSpPr>
+              <a:cxnSpLocks/>
+              <a:endCxn id="8" idx="2"/>
+            </p:cNvCxnSpPr>
+            <p:nvPr/>
+          </p:nvCxnSpPr>
+          <p:spPr>
+            <a:xfrm flipV="1">
+              <a:off x="3028453" y="1276781"/>
+              <a:ext cx="1" cy="231272"/>
+            </a:xfrm>
+            <a:prstGeom prst="straightConnector1">
+              <a:avLst/>
+            </a:prstGeom>
+            <a:ln w="38100">
+              <a:solidFill>
+                <a:schemeClr val="tx1"/>
+              </a:solidFill>
+              <a:tailEnd type="triangle"/>
+            </a:ln>
+          </p:spPr>
+          <p:style>
+            <a:lnRef idx="1">
+              <a:schemeClr val="accent1"/>
+            </a:lnRef>
+            <a:fillRef idx="0">
+              <a:schemeClr val="accent1"/>
+            </a:fillRef>
+            <a:effectRef idx="0">
+              <a:schemeClr val="accent1"/>
+            </a:effectRef>
+            <a:fontRef idx="minor">
+              <a:schemeClr val="tx1"/>
+            </a:fontRef>
+          </p:style>
+        </p:cxnSp>
+        <p:sp>
+          <p:nvSpPr>
+            <p:cNvPr id="56" name="四角形: 角を丸くする 9"/>
+            <p:cNvSpPr/>
+            <p:nvPr/>
+          </p:nvSpPr>
+          <p:spPr>
+            <a:xfrm>
+              <a:off x="7873405" y="527720"/>
+              <a:ext cx="1163091" cy="749061"/>
+            </a:xfrm>
+            <a:prstGeom prst="roundRect">
+              <a:avLst/>
+            </a:prstGeom>
+            <a:solidFill>
+              <a:schemeClr val="accent3">
+                <a:lumMod val="50000"/>
+              </a:schemeClr>
+            </a:solidFill>
+            <a:ln>
+              <a:solidFill>
+                <a:schemeClr val="accent3">
+                  <a:lumMod val="50000"/>
+                </a:schemeClr>
+              </a:solidFill>
+            </a:ln>
+          </p:spPr>
+          <p:style>
+            <a:lnRef idx="2">
+              <a:schemeClr val="accent1">
+                <a:shade val="50000"/>
+              </a:schemeClr>
+            </a:lnRef>
+            <a:fillRef idx="1">
+              <a:schemeClr val="accent1"/>
+            </a:fillRef>
+            <a:effectRef idx="0">
+              <a:schemeClr val="accent1"/>
+            </a:effectRef>
+            <a:fontRef idx="minor">
+              <a:schemeClr val="lt1"/>
+            </a:fontRef>
+          </p:style>
+          <p:txBody>
+            <a:bodyPr rtlCol="0" anchor="ctr"/>
+            <a:lstStyle/>
+            <a:p>
+              <a:pPr algn="ctr"/>
+              <a:r>
+                <a:rPr lang="en-US" altLang="ja-JP" sz="1400" dirty="0">
+                  <a:solidFill>
+                    <a:schemeClr val="bg1"/>
+                  </a:solidFill>
+                </a:rPr>
+                <a:t>Customer</a:t>
+              </a:r>
+              <a:r>
+                <a:rPr lang="ja-JP" altLang="en-US" sz="1400" dirty="0">
+                  <a:solidFill>
+                    <a:schemeClr val="bg1"/>
+                  </a:solidFill>
+                </a:rPr>
+                <a:t> </a:t>
+              </a:r>
+              <a:r>
+                <a:rPr lang="en-US" altLang="ja-JP" sz="1400" dirty="0">
+                  <a:solidFill>
+                    <a:schemeClr val="bg1"/>
+                  </a:solidFill>
+                </a:rPr>
+                <a:t>Company</a:t>
+              </a:r>
+              <a:endParaRPr kumimoji="1" lang="ja-JP" altLang="en-US" sz="1400" dirty="0">
+                <a:solidFill>
+                  <a:schemeClr val="bg1"/>
+                </a:solidFill>
+              </a:endParaRPr>
+            </a:p>
+          </p:txBody>
+        </p:sp>
+        <p:cxnSp>
+          <p:nvCxnSpPr>
+            <p:cNvPr id="57" name="直線矢印コネクタ 56"/>
+            <p:cNvCxnSpPr>
+              <a:cxnSpLocks/>
+              <a:endCxn id="56" idx="1"/>
+            </p:cNvCxnSpPr>
+            <p:nvPr/>
+          </p:nvCxnSpPr>
+          <p:spPr>
+            <a:xfrm flipV="1">
+              <a:off x="7249565" y="902251"/>
+              <a:ext cx="623840" cy="4214"/>
+            </a:xfrm>
+            <a:prstGeom prst="straightConnector1">
+              <a:avLst/>
+            </a:prstGeom>
+            <a:ln w="38100">
+              <a:solidFill>
+                <a:schemeClr val="tx1"/>
+              </a:solidFill>
+              <a:tailEnd type="triangle"/>
+            </a:ln>
+          </p:spPr>
+          <p:style>
+            <a:lnRef idx="1">
+              <a:schemeClr val="accent1"/>
+            </a:lnRef>
+            <a:fillRef idx="0">
+              <a:schemeClr val="accent1"/>
+            </a:fillRef>
+            <a:effectRef idx="0">
+              <a:schemeClr val="accent1"/>
+            </a:effectRef>
+            <a:fontRef idx="minor">
+              <a:schemeClr val="tx1"/>
+            </a:fontRef>
+          </p:style>
+        </p:cxnSp>
+        <p:sp>
+          <p:nvSpPr>
+            <p:cNvPr id="58" name="四角形: 角を丸くする 52"/>
+            <p:cNvSpPr/>
+            <p:nvPr/>
+          </p:nvSpPr>
+          <p:spPr>
+            <a:xfrm>
+              <a:off x="6073205" y="527720"/>
+              <a:ext cx="1163091" cy="381000"/>
+            </a:xfrm>
+            <a:prstGeom prst="roundRect">
+              <a:avLst/>
+            </a:prstGeom>
+            <a:solidFill>
+              <a:srgbClr val="FFFF00"/>
+            </a:solidFill>
+          </p:spPr>
+          <p:style>
+            <a:lnRef idx="2">
+              <a:schemeClr val="accent1">
+                <a:shade val="50000"/>
+              </a:schemeClr>
+            </a:lnRef>
+            <a:fillRef idx="1">
+              <a:schemeClr val="accent1"/>
+            </a:fillRef>
+            <a:effectRef idx="0">
+              <a:schemeClr val="accent1"/>
+            </a:effectRef>
+            <a:fontRef idx="minor">
+              <a:schemeClr val="lt1"/>
+            </a:fontRef>
+          </p:style>
+          <p:txBody>
+            <a:bodyPr rtlCol="0" anchor="ctr"/>
+            <a:lstStyle/>
+            <a:p>
+              <a:pPr algn="ctr"/>
+              <a:r>
+                <a:rPr kumimoji="1" lang="en-US" altLang="ja-JP" sz="1400" dirty="0">
+                  <a:solidFill>
+                    <a:schemeClr val="tx1"/>
+                  </a:solidFill>
+                </a:rPr>
+                <a:t>Release</a:t>
+              </a:r>
+              <a:endParaRPr kumimoji="1" lang="ja-JP" altLang="en-US" sz="1400" dirty="0">
+                <a:solidFill>
+                  <a:schemeClr val="tx1"/>
+                </a:solidFill>
+              </a:endParaRPr>
+            </a:p>
+          </p:txBody>
+        </p:sp>
+        <p:sp>
+          <p:nvSpPr>
+            <p:cNvPr id="135" name="テキスト ボックス 134"/>
+            <p:cNvSpPr txBox="1"/>
+            <p:nvPr/>
+          </p:nvSpPr>
+          <p:spPr>
+            <a:xfrm>
+              <a:off x="7385512" y="580263"/>
+              <a:ext cx="439544" cy="307777"/>
+            </a:xfrm>
+            <a:prstGeom prst="rect">
+              <a:avLst/>
+            </a:prstGeom>
+            <a:noFill/>
+          </p:spPr>
+          <p:txBody>
+            <a:bodyPr wrap="none" rtlCol="0">
+              <a:spAutoFit/>
+            </a:bodyPr>
+            <a:lstStyle/>
+            <a:p>
+              <a:r>
+                <a:rPr lang="en-US" altLang="ja-JP" sz="1400" dirty="0"/>
+                <a:t>Sell</a:t>
+              </a:r>
+              <a:endParaRPr kumimoji="1" lang="ja-JP" altLang="en-US" sz="1400" dirty="0"/>
+            </a:p>
+          </p:txBody>
+        </p:sp>
+        <p:sp>
+          <p:nvSpPr>
+            <p:cNvPr id="136" name="四角形: 角を丸くする 52"/>
+            <p:cNvSpPr/>
+            <p:nvPr/>
+          </p:nvSpPr>
+          <p:spPr>
+            <a:xfrm>
+              <a:off x="6073205" y="908720"/>
+              <a:ext cx="1163091" cy="381000"/>
+            </a:xfrm>
+            <a:prstGeom prst="roundRect">
+              <a:avLst/>
+            </a:prstGeom>
+            <a:solidFill>
+              <a:srgbClr val="FFFF00"/>
+            </a:solidFill>
+          </p:spPr>
+          <p:style>
+            <a:lnRef idx="2">
+              <a:schemeClr val="accent1">
+                <a:shade val="50000"/>
+              </a:schemeClr>
+            </a:lnRef>
+            <a:fillRef idx="1">
+              <a:schemeClr val="accent1"/>
+            </a:fillRef>
+            <a:effectRef idx="0">
+              <a:schemeClr val="accent1"/>
+            </a:effectRef>
+            <a:fontRef idx="minor">
+              <a:schemeClr val="lt1"/>
+            </a:fontRef>
+          </p:style>
+          <p:txBody>
+            <a:bodyPr rtlCol="0" anchor="ctr"/>
+            <a:lstStyle/>
+            <a:p>
+              <a:pPr algn="ctr"/>
+              <a:r>
+                <a:rPr kumimoji="1" lang="en-US" altLang="ja-JP" sz="1400" dirty="0">
+                  <a:solidFill>
+                    <a:schemeClr val="tx1"/>
+                  </a:solidFill>
+                </a:rPr>
+                <a:t>Support</a:t>
+              </a:r>
+              <a:endParaRPr kumimoji="1" lang="ja-JP" altLang="en-US" sz="1400" dirty="0">
+                <a:solidFill>
+                  <a:schemeClr val="tx1"/>
+                </a:solidFill>
+              </a:endParaRPr>
+            </a:p>
+          </p:txBody>
+        </p:sp>
+        <p:sp>
+          <p:nvSpPr>
+            <p:cNvPr id="69" name="テキスト ボックス 68">
+              <a:extLst>
+                <a:ext uri="{FF2B5EF4-FFF2-40B4-BE49-F238E27FC236}">
+                  <a16:creationId xmlns:a16="http://schemas.microsoft.com/office/drawing/2014/main" id="{14079DDE-B385-4341-A4EE-6B72D7A65F30}"/>
+                </a:ext>
+              </a:extLst>
+            </p:cNvPr>
+            <p:cNvSpPr txBox="1"/>
+            <p:nvPr/>
+          </p:nvSpPr>
+          <p:spPr>
+            <a:xfrm>
+              <a:off x="3574851" y="1450244"/>
+              <a:ext cx="1043876" cy="523220"/>
+            </a:xfrm>
+            <a:prstGeom prst="rect">
+              <a:avLst/>
+            </a:prstGeom>
+            <a:noFill/>
+          </p:spPr>
+          <p:txBody>
+            <a:bodyPr wrap="none" rtlCol="0">
+              <a:spAutoFit/>
+            </a:bodyPr>
+            <a:lstStyle/>
+            <a:p>
+              <a:r>
+                <a:rPr kumimoji="1" lang="en-US" altLang="ja-JP" sz="1400" dirty="0"/>
+                <a:t>OSS +</a:t>
+              </a:r>
+            </a:p>
+            <a:p>
+              <a:r>
+                <a:rPr kumimoji="1" lang="en-US" altLang="ja-JP" sz="1400" dirty="0"/>
+                <a:t>OSS</a:t>
+              </a:r>
+              <a:r>
+                <a:rPr kumimoji="1" lang="ja-JP" altLang="en-US" sz="1400" dirty="0"/>
+                <a:t> </a:t>
+              </a:r>
+              <a:r>
+                <a:rPr kumimoji="1" lang="en-US" altLang="ja-JP" sz="1400" dirty="0"/>
+                <a:t>License</a:t>
+              </a:r>
+              <a:endParaRPr kumimoji="1" lang="ja-JP" altLang="en-US" sz="1400" dirty="0"/>
+            </a:p>
+          </p:txBody>
+        </p:sp>
+      </p:grpSp>
+      <p:grpSp>
+        <p:nvGrpSpPr>
+          <p:cNvPr id="12" name="グループ化 11">
+            <a:extLst>
+              <a:ext uri="{FF2B5EF4-FFF2-40B4-BE49-F238E27FC236}">
+                <a16:creationId xmlns:a16="http://schemas.microsoft.com/office/drawing/2014/main" id="{90921A6C-0282-4469-9EE5-5E9DAD93DB26}"/>
+              </a:ext>
+            </a:extLst>
+          </p:cNvPr>
+          <p:cNvGrpSpPr/>
+          <p:nvPr/>
+        </p:nvGrpSpPr>
+        <p:grpSpPr>
+          <a:xfrm>
+            <a:off x="301525" y="2060847"/>
+            <a:ext cx="8734971" cy="1414272"/>
+            <a:chOff x="301525" y="2060847"/>
+            <a:chExt cx="8734971" cy="1414272"/>
+          </a:xfrm>
+        </p:grpSpPr>
+        <p:sp>
+          <p:nvSpPr>
+            <p:cNvPr id="64" name="テキスト ボックス 63"/>
+            <p:cNvSpPr txBox="1"/>
+            <p:nvPr/>
+          </p:nvSpPr>
+          <p:spPr>
+            <a:xfrm>
+              <a:off x="301525" y="2255912"/>
+              <a:ext cx="1177331" cy="381000"/>
+            </a:xfrm>
+            <a:prstGeom prst="rect">
+              <a:avLst/>
+            </a:prstGeom>
+            <a:noFill/>
+          </p:spPr>
+          <p:txBody>
+            <a:bodyPr wrap="square" rtlCol="0">
+              <a:spAutoFit/>
+            </a:bodyPr>
+            <a:lstStyle/>
+            <a:p>
+              <a:r>
+                <a:rPr lang="en-US" altLang="ja-JP" dirty="0"/>
+                <a:t>IT-2</a:t>
+              </a:r>
+              <a:endParaRPr kumimoji="1" lang="ja-JP" altLang="en-US" dirty="0"/>
+            </a:p>
+          </p:txBody>
+        </p:sp>
+        <p:sp>
+          <p:nvSpPr>
+            <p:cNvPr id="65" name="四角形: 角を丸くする 2"/>
+            <p:cNvSpPr/>
+            <p:nvPr/>
+          </p:nvSpPr>
+          <p:spPr>
+            <a:xfrm>
+              <a:off x="2411760" y="2060847"/>
+              <a:ext cx="4981794" cy="922153"/>
+            </a:xfrm>
+            <a:prstGeom prst="roundRect">
+              <a:avLst/>
+            </a:prstGeom>
+            <a:solidFill>
+              <a:schemeClr val="accent1">
+                <a:lumMod val="60000"/>
+                <a:lumOff val="40000"/>
+              </a:schemeClr>
+            </a:solidFill>
+          </p:spPr>
+          <p:style>
+            <a:lnRef idx="2">
+              <a:schemeClr val="accent1">
+                <a:shade val="50000"/>
+              </a:schemeClr>
+            </a:lnRef>
+            <a:fillRef idx="1">
+              <a:schemeClr val="accent1"/>
+            </a:fillRef>
+            <a:effectRef idx="0">
+              <a:schemeClr val="accent1"/>
+            </a:effectRef>
+            <a:fontRef idx="minor">
+              <a:schemeClr val="lt1"/>
+            </a:fontRef>
+          </p:style>
+          <p:txBody>
+            <a:bodyPr rtlCol="0" anchor="ctr"/>
+            <a:lstStyle/>
+            <a:p>
+              <a:pPr algn="ctr"/>
+              <a:endParaRPr kumimoji="1" lang="ja-JP" altLang="en-US" sz="1400"/>
+            </a:p>
+          </p:txBody>
+        </p:sp>
+        <p:sp>
+          <p:nvSpPr>
+            <p:cNvPr id="68" name="四角形: 角を丸くする 7"/>
+            <p:cNvSpPr/>
+            <p:nvPr/>
+          </p:nvSpPr>
+          <p:spPr>
+            <a:xfrm>
+              <a:off x="3243531" y="2142148"/>
+              <a:ext cx="968429" cy="659378"/>
+            </a:xfrm>
+            <a:prstGeom prst="roundRect">
+              <a:avLst/>
+            </a:prstGeom>
+            <a:solidFill>
+              <a:srgbClr val="FFFF00"/>
+            </a:solidFill>
+          </p:spPr>
+          <p:style>
+            <a:lnRef idx="2">
+              <a:schemeClr val="accent1">
+                <a:shade val="50000"/>
+              </a:schemeClr>
+            </a:lnRef>
+            <a:fillRef idx="1">
+              <a:schemeClr val="accent1"/>
+            </a:fillRef>
+            <a:effectRef idx="0">
+              <a:schemeClr val="accent1"/>
+            </a:effectRef>
+            <a:fontRef idx="minor">
+              <a:schemeClr val="lt1"/>
+            </a:fontRef>
+          </p:style>
+          <p:txBody>
+            <a:bodyPr rtlCol="0" anchor="ctr"/>
+            <a:lstStyle/>
+            <a:p>
+              <a:pPr algn="ctr"/>
+              <a:r>
+                <a:rPr lang="en-US" altLang="ja-JP" sz="1400" dirty="0">
+                  <a:solidFill>
+                    <a:schemeClr val="tx1"/>
+                  </a:solidFill>
+                </a:rPr>
+                <a:t>Planning/Inbound</a:t>
+              </a:r>
+              <a:endParaRPr kumimoji="1" lang="ja-JP" altLang="en-US" sz="1400" dirty="0">
+                <a:solidFill>
+                  <a:schemeClr val="tx1"/>
+                </a:solidFill>
+              </a:endParaRPr>
+            </a:p>
+          </p:txBody>
+        </p:sp>
+        <p:cxnSp>
+          <p:nvCxnSpPr>
+            <p:cNvPr id="70" name="直線矢印コネクタ 69"/>
+            <p:cNvCxnSpPr>
+              <a:cxnSpLocks/>
+              <a:stCxn id="68" idx="3"/>
+              <a:endCxn id="71" idx="1"/>
+            </p:cNvCxnSpPr>
+            <p:nvPr/>
+          </p:nvCxnSpPr>
+          <p:spPr>
+            <a:xfrm>
+              <a:off x="4211960" y="2471837"/>
+              <a:ext cx="288032" cy="11648"/>
+            </a:xfrm>
+            <a:prstGeom prst="straightConnector1">
+              <a:avLst/>
+            </a:prstGeom>
+            <a:ln w="38100">
+              <a:solidFill>
+                <a:schemeClr val="tx1"/>
+              </a:solidFill>
+              <a:tailEnd type="triangle"/>
+            </a:ln>
+          </p:spPr>
+          <p:style>
+            <a:lnRef idx="1">
+              <a:schemeClr val="accent1"/>
+            </a:lnRef>
+            <a:fillRef idx="0">
+              <a:schemeClr val="accent1"/>
+            </a:fillRef>
+            <a:effectRef idx="0">
+              <a:schemeClr val="accent1"/>
+            </a:effectRef>
+            <a:fontRef idx="minor">
+              <a:schemeClr val="tx1"/>
+            </a:fontRef>
+          </p:style>
+        </p:cxnSp>
+        <p:sp>
+          <p:nvSpPr>
+            <p:cNvPr id="71" name="四角形: 角を丸くする 52"/>
+            <p:cNvSpPr/>
+            <p:nvPr/>
+          </p:nvSpPr>
+          <p:spPr>
+            <a:xfrm>
+              <a:off x="4499992" y="2292985"/>
+              <a:ext cx="1163091" cy="381000"/>
+            </a:xfrm>
+            <a:prstGeom prst="roundRect">
+              <a:avLst/>
+            </a:prstGeom>
+            <a:solidFill>
+              <a:srgbClr val="FFFF00"/>
+            </a:solidFill>
+          </p:spPr>
+          <p:style>
+            <a:lnRef idx="2">
+              <a:schemeClr val="accent1">
+                <a:shade val="50000"/>
+              </a:schemeClr>
+            </a:lnRef>
+            <a:fillRef idx="1">
+              <a:schemeClr val="accent1"/>
+            </a:fillRef>
+            <a:effectRef idx="0">
+              <a:schemeClr val="accent1"/>
+            </a:effectRef>
+            <a:fontRef idx="minor">
+              <a:schemeClr val="lt1"/>
+            </a:fontRef>
+          </p:style>
+          <p:txBody>
+            <a:bodyPr rtlCol="0" anchor="ctr"/>
+            <a:lstStyle/>
+            <a:p>
+              <a:pPr algn="ctr"/>
+              <a:r>
+                <a:rPr lang="en-US" altLang="ja-JP" sz="1400" dirty="0">
+                  <a:solidFill>
+                    <a:schemeClr val="tx1"/>
+                  </a:solidFill>
+                </a:rPr>
+                <a:t>Verification</a:t>
+              </a:r>
+              <a:endParaRPr kumimoji="1" lang="ja-JP" altLang="en-US" sz="1400" dirty="0">
+                <a:solidFill>
+                  <a:schemeClr val="tx1"/>
+                </a:solidFill>
+              </a:endParaRPr>
+            </a:p>
+          </p:txBody>
+        </p:sp>
+        <p:cxnSp>
+          <p:nvCxnSpPr>
+            <p:cNvPr id="74" name="直線矢印コネクタ 73"/>
+            <p:cNvCxnSpPr>
+              <a:cxnSpLocks/>
+              <a:stCxn id="71" idx="3"/>
+            </p:cNvCxnSpPr>
+            <p:nvPr/>
+          </p:nvCxnSpPr>
+          <p:spPr>
+            <a:xfrm>
+              <a:off x="5663083" y="2483485"/>
+              <a:ext cx="432047" cy="38438"/>
+            </a:xfrm>
+            <a:prstGeom prst="straightConnector1">
+              <a:avLst/>
+            </a:prstGeom>
+            <a:ln w="38100">
+              <a:solidFill>
+                <a:schemeClr val="tx1"/>
+              </a:solidFill>
+              <a:tailEnd type="triangle"/>
+            </a:ln>
+          </p:spPr>
+          <p:style>
+            <a:lnRef idx="1">
+              <a:schemeClr val="accent1"/>
+            </a:lnRef>
+            <a:fillRef idx="0">
+              <a:schemeClr val="accent1"/>
+            </a:fillRef>
+            <a:effectRef idx="0">
+              <a:schemeClr val="accent1"/>
+            </a:effectRef>
+            <a:fontRef idx="minor">
+              <a:schemeClr val="tx1"/>
+            </a:fontRef>
+          </p:style>
+        </p:cxnSp>
+        <p:sp>
+          <p:nvSpPr>
+            <p:cNvPr id="77" name="四角形: 角を丸くする 48"/>
+            <p:cNvSpPr/>
+            <p:nvPr/>
+          </p:nvSpPr>
+          <p:spPr>
+            <a:xfrm>
+              <a:off x="1075726" y="2956583"/>
+              <a:ext cx="1163091" cy="381000"/>
+            </a:xfrm>
+            <a:prstGeom prst="roundRect">
+              <a:avLst/>
+            </a:prstGeom>
+            <a:solidFill>
+              <a:schemeClr val="accent3">
+                <a:lumMod val="50000"/>
+              </a:schemeClr>
+            </a:solidFill>
+            <a:ln>
+              <a:solidFill>
+                <a:schemeClr val="accent3">
+                  <a:lumMod val="50000"/>
+                </a:schemeClr>
+              </a:solidFill>
+            </a:ln>
+          </p:spPr>
+          <p:style>
+            <a:lnRef idx="2">
+              <a:schemeClr val="accent1">
+                <a:shade val="50000"/>
+              </a:schemeClr>
+            </a:lnRef>
+            <a:fillRef idx="1">
+              <a:schemeClr val="accent1"/>
+            </a:fillRef>
+            <a:effectRef idx="0">
+              <a:schemeClr val="accent1"/>
+            </a:effectRef>
+            <a:fontRef idx="minor">
+              <a:schemeClr val="lt1"/>
+            </a:fontRef>
+          </p:style>
+          <p:txBody>
+            <a:bodyPr rtlCol="0" anchor="ctr"/>
+            <a:lstStyle/>
+            <a:p>
+              <a:pPr algn="ctr"/>
+              <a:r>
+                <a:rPr lang="en-US" altLang="ja-JP" sz="1400" dirty="0">
+                  <a:solidFill>
+                    <a:schemeClr val="bg1"/>
+                  </a:solidFill>
+                </a:rPr>
+                <a:t>Community</a:t>
+              </a:r>
+              <a:endParaRPr kumimoji="1" lang="ja-JP" altLang="en-US" sz="1400" dirty="0">
+                <a:solidFill>
+                  <a:schemeClr val="bg1"/>
+                </a:solidFill>
+              </a:endParaRPr>
+            </a:p>
+          </p:txBody>
+        </p:sp>
+        <p:cxnSp>
+          <p:nvCxnSpPr>
+            <p:cNvPr id="78" name="直線矢印コネクタ 77"/>
+            <p:cNvCxnSpPr>
+              <a:cxnSpLocks/>
+              <a:stCxn id="77" idx="0"/>
+              <a:endCxn id="102" idx="2"/>
+            </p:cNvCxnSpPr>
+            <p:nvPr/>
+          </p:nvCxnSpPr>
+          <p:spPr>
+            <a:xfrm flipV="1">
+              <a:off x="1657272" y="2692556"/>
+              <a:ext cx="6211" cy="264027"/>
+            </a:xfrm>
+            <a:prstGeom prst="straightConnector1">
+              <a:avLst/>
+            </a:prstGeom>
+            <a:ln w="38100">
+              <a:solidFill>
+                <a:schemeClr val="tx1"/>
+              </a:solidFill>
+              <a:tailEnd type="triangle"/>
+            </a:ln>
+          </p:spPr>
+          <p:style>
+            <a:lnRef idx="1">
+              <a:schemeClr val="accent1"/>
+            </a:lnRef>
+            <a:fillRef idx="0">
+              <a:schemeClr val="accent1"/>
+            </a:fillRef>
+            <a:effectRef idx="0">
+              <a:schemeClr val="accent1"/>
+            </a:effectRef>
+            <a:fontRef idx="minor">
+              <a:schemeClr val="tx1"/>
+            </a:fontRef>
+          </p:style>
+        </p:cxnSp>
+        <p:sp>
+          <p:nvSpPr>
+            <p:cNvPr id="84" name="四角形: 角を丸くする 9"/>
+            <p:cNvSpPr/>
+            <p:nvPr/>
+          </p:nvSpPr>
+          <p:spPr>
+            <a:xfrm>
+              <a:off x="7873405" y="2132856"/>
+              <a:ext cx="1163091" cy="762000"/>
+            </a:xfrm>
+            <a:prstGeom prst="roundRect">
+              <a:avLst/>
+            </a:prstGeom>
+            <a:solidFill>
+              <a:schemeClr val="accent3">
+                <a:lumMod val="50000"/>
+              </a:schemeClr>
+            </a:solidFill>
+            <a:ln>
+              <a:solidFill>
+                <a:schemeClr val="accent3">
+                  <a:lumMod val="50000"/>
+                </a:schemeClr>
+              </a:solidFill>
+            </a:ln>
+          </p:spPr>
+          <p:style>
+            <a:lnRef idx="2">
+              <a:schemeClr val="accent1">
+                <a:shade val="50000"/>
+              </a:schemeClr>
+            </a:lnRef>
+            <a:fillRef idx="1">
+              <a:schemeClr val="accent1"/>
+            </a:fillRef>
+            <a:effectRef idx="0">
+              <a:schemeClr val="accent1"/>
+            </a:effectRef>
+            <a:fontRef idx="minor">
+              <a:schemeClr val="lt1"/>
+            </a:fontRef>
+          </p:style>
+          <p:txBody>
+            <a:bodyPr rtlCol="0" anchor="ctr"/>
+            <a:lstStyle/>
+            <a:p>
+              <a:pPr algn="ctr"/>
+              <a:r>
+                <a:rPr lang="en-US" altLang="ja-JP" sz="1400" dirty="0">
+                  <a:solidFill>
+                    <a:schemeClr val="bg1"/>
+                  </a:solidFill>
+                </a:rPr>
+                <a:t>Customer</a:t>
+              </a:r>
+              <a:r>
+                <a:rPr lang="ja-JP" altLang="en-US" sz="1400" dirty="0">
+                  <a:solidFill>
+                    <a:schemeClr val="bg1"/>
+                  </a:solidFill>
+                </a:rPr>
+                <a:t> </a:t>
+              </a:r>
+              <a:r>
+                <a:rPr lang="en-US" altLang="ja-JP" sz="1400" dirty="0">
+                  <a:solidFill>
+                    <a:schemeClr val="bg1"/>
+                  </a:solidFill>
+                </a:rPr>
+                <a:t>Company</a:t>
+              </a:r>
+              <a:endParaRPr kumimoji="1" lang="ja-JP" altLang="en-US" sz="1400" dirty="0">
+                <a:solidFill>
+                  <a:schemeClr val="bg1"/>
+                </a:solidFill>
+              </a:endParaRPr>
+            </a:p>
+          </p:txBody>
+        </p:sp>
+        <p:cxnSp>
+          <p:nvCxnSpPr>
+            <p:cNvPr id="85" name="直線矢印コネクタ 84"/>
+            <p:cNvCxnSpPr>
+              <a:cxnSpLocks/>
+              <a:endCxn id="84" idx="1"/>
+            </p:cNvCxnSpPr>
+            <p:nvPr/>
+          </p:nvCxnSpPr>
+          <p:spPr>
+            <a:xfrm>
+              <a:off x="7164288" y="2506752"/>
+              <a:ext cx="709117" cy="7104"/>
+            </a:xfrm>
+            <a:prstGeom prst="straightConnector1">
+              <a:avLst/>
+            </a:prstGeom>
+            <a:ln w="38100">
+              <a:solidFill>
+                <a:schemeClr val="tx1"/>
+              </a:solidFill>
+              <a:tailEnd type="triangle"/>
+            </a:ln>
+          </p:spPr>
+          <p:style>
+            <a:lnRef idx="1">
+              <a:schemeClr val="accent1"/>
+            </a:lnRef>
+            <a:fillRef idx="0">
+              <a:schemeClr val="accent1"/>
+            </a:fillRef>
+            <a:effectRef idx="0">
+              <a:schemeClr val="accent1"/>
+            </a:effectRef>
+            <a:fontRef idx="minor">
+              <a:schemeClr val="tx1"/>
+            </a:fontRef>
+          </p:style>
+        </p:cxnSp>
+        <p:sp>
+          <p:nvSpPr>
+            <p:cNvPr id="102" name="四角形: 角を丸くする 9"/>
+            <p:cNvSpPr/>
+            <p:nvPr/>
+          </p:nvSpPr>
+          <p:spPr>
+            <a:xfrm>
+              <a:off x="1197031" y="2236253"/>
+              <a:ext cx="932904" cy="456303"/>
+            </a:xfrm>
+            <a:prstGeom prst="roundRect">
+              <a:avLst/>
+            </a:prstGeom>
+            <a:solidFill>
+              <a:schemeClr val="accent3">
+                <a:lumMod val="50000"/>
+              </a:schemeClr>
+            </a:solidFill>
+            <a:ln>
+              <a:solidFill>
+                <a:schemeClr val="accent3">
+                  <a:lumMod val="50000"/>
+                </a:schemeClr>
+              </a:solidFill>
+            </a:ln>
+          </p:spPr>
+          <p:style>
+            <a:lnRef idx="2">
+              <a:schemeClr val="accent1">
+                <a:shade val="50000"/>
+              </a:schemeClr>
+            </a:lnRef>
+            <a:fillRef idx="1">
+              <a:schemeClr val="accent1"/>
+            </a:fillRef>
+            <a:effectRef idx="0">
+              <a:schemeClr val="accent1"/>
+            </a:effectRef>
+            <a:fontRef idx="minor">
+              <a:schemeClr val="lt1"/>
+            </a:fontRef>
+          </p:style>
+          <p:txBody>
+            <a:bodyPr rtlCol="0" anchor="ctr"/>
+            <a:lstStyle/>
+            <a:p>
+              <a:pPr algn="ctr"/>
+              <a:r>
+                <a:rPr lang="en-US" altLang="ja-JP" sz="1400" dirty="0">
+                  <a:solidFill>
+                    <a:schemeClr val="bg1"/>
+                  </a:solidFill>
+                </a:rPr>
+                <a:t>ISV</a:t>
+              </a:r>
+            </a:p>
+          </p:txBody>
+        </p:sp>
+        <p:cxnSp>
+          <p:nvCxnSpPr>
+            <p:cNvPr id="103" name="直線矢印コネクタ 102"/>
+            <p:cNvCxnSpPr>
+              <a:cxnSpLocks/>
+              <a:stCxn id="102" idx="3"/>
+              <a:endCxn id="68" idx="1"/>
+            </p:cNvCxnSpPr>
+            <p:nvPr/>
+          </p:nvCxnSpPr>
+          <p:spPr>
+            <a:xfrm>
+              <a:off x="2129935" y="2464405"/>
+              <a:ext cx="1113596" cy="7432"/>
+            </a:xfrm>
+            <a:prstGeom prst="straightConnector1">
+              <a:avLst/>
+            </a:prstGeom>
+            <a:ln w="38100">
+              <a:solidFill>
+                <a:schemeClr val="tx1"/>
+              </a:solidFill>
+              <a:headEnd type="triangle" w="med" len="med"/>
+              <a:tailEnd type="triangle" w="med" len="med"/>
+            </a:ln>
+          </p:spPr>
+          <p:style>
+            <a:lnRef idx="1">
+              <a:schemeClr val="accent1"/>
+            </a:lnRef>
+            <a:fillRef idx="0">
+              <a:schemeClr val="accent1"/>
+            </a:fillRef>
+            <a:effectRef idx="0">
+              <a:schemeClr val="accent1"/>
+            </a:effectRef>
+            <a:fontRef idx="minor">
+              <a:schemeClr val="tx1"/>
+            </a:fontRef>
+          </p:style>
+        </p:cxnSp>
+        <p:sp>
+          <p:nvSpPr>
+            <p:cNvPr id="24" name="テキスト ボックス 23"/>
+            <p:cNvSpPr txBox="1"/>
+            <p:nvPr/>
+          </p:nvSpPr>
+          <p:spPr>
+            <a:xfrm>
+              <a:off x="2437614" y="2182118"/>
+              <a:ext cx="855412" cy="307777"/>
+            </a:xfrm>
+            <a:prstGeom prst="rect">
+              <a:avLst/>
+            </a:prstGeom>
+            <a:noFill/>
+          </p:spPr>
+          <p:txBody>
+            <a:bodyPr wrap="square" rtlCol="0">
+              <a:spAutoFit/>
+            </a:bodyPr>
+            <a:lstStyle/>
+            <a:p>
+              <a:r>
+                <a:rPr kumimoji="1" lang="en-US" altLang="ja-JP" sz="1400" dirty="0"/>
+                <a:t>Contract</a:t>
+              </a:r>
+              <a:endParaRPr kumimoji="1" lang="ja-JP" altLang="en-US" sz="1400" dirty="0"/>
+            </a:p>
+          </p:txBody>
+        </p:sp>
+        <p:sp>
+          <p:nvSpPr>
+            <p:cNvPr id="138" name="テキスト ボックス 137"/>
+            <p:cNvSpPr txBox="1"/>
+            <p:nvPr/>
+          </p:nvSpPr>
+          <p:spPr>
+            <a:xfrm>
+              <a:off x="7363933" y="2175708"/>
+              <a:ext cx="439544" cy="307777"/>
+            </a:xfrm>
+            <a:prstGeom prst="rect">
+              <a:avLst/>
+            </a:prstGeom>
+            <a:noFill/>
+          </p:spPr>
+          <p:txBody>
+            <a:bodyPr wrap="none" rtlCol="0">
+              <a:spAutoFit/>
+            </a:bodyPr>
+            <a:lstStyle/>
+            <a:p>
+              <a:r>
+                <a:rPr lang="en-US" altLang="ja-JP" sz="1400" dirty="0"/>
+                <a:t>Sell</a:t>
+              </a:r>
+              <a:endParaRPr kumimoji="1" lang="ja-JP" altLang="en-US" sz="1400" dirty="0"/>
+            </a:p>
+          </p:txBody>
+        </p:sp>
+        <p:sp>
+          <p:nvSpPr>
+            <p:cNvPr id="140" name="テキスト ボックス 139"/>
+            <p:cNvSpPr txBox="1"/>
+            <p:nvPr/>
+          </p:nvSpPr>
+          <p:spPr>
+            <a:xfrm>
+              <a:off x="2498971" y="2489895"/>
+              <a:ext cx="673582" cy="307777"/>
+            </a:xfrm>
+            <a:prstGeom prst="rect">
+              <a:avLst/>
+            </a:prstGeom>
+            <a:noFill/>
+          </p:spPr>
+          <p:txBody>
+            <a:bodyPr wrap="none" rtlCol="0">
+              <a:spAutoFit/>
+            </a:bodyPr>
+            <a:lstStyle/>
+            <a:p>
+              <a:r>
+                <a:rPr lang="en-US" altLang="ja-JP" sz="1400" dirty="0"/>
+                <a:t>Supply</a:t>
+              </a:r>
+              <a:endParaRPr kumimoji="1" lang="ja-JP" altLang="en-US" sz="1400" dirty="0"/>
+            </a:p>
+          </p:txBody>
+        </p:sp>
+        <p:sp>
+          <p:nvSpPr>
+            <p:cNvPr id="164" name="四角形: 角を丸くする 52"/>
+            <p:cNvSpPr/>
+            <p:nvPr/>
+          </p:nvSpPr>
+          <p:spPr>
+            <a:xfrm>
+              <a:off x="6084168" y="2132856"/>
+              <a:ext cx="1163091" cy="381000"/>
+            </a:xfrm>
+            <a:prstGeom prst="roundRect">
+              <a:avLst/>
+            </a:prstGeom>
+            <a:solidFill>
+              <a:srgbClr val="FFFF00"/>
+            </a:solidFill>
+          </p:spPr>
+          <p:style>
+            <a:lnRef idx="2">
+              <a:schemeClr val="accent1">
+                <a:shade val="50000"/>
+              </a:schemeClr>
+            </a:lnRef>
+            <a:fillRef idx="1">
+              <a:schemeClr val="accent1"/>
+            </a:fillRef>
+            <a:effectRef idx="0">
+              <a:schemeClr val="accent1"/>
+            </a:effectRef>
+            <a:fontRef idx="minor">
+              <a:schemeClr val="lt1"/>
+            </a:fontRef>
+          </p:style>
+          <p:txBody>
+            <a:bodyPr rtlCol="0" anchor="ctr"/>
+            <a:lstStyle/>
+            <a:p>
+              <a:pPr algn="ctr"/>
+              <a:r>
+                <a:rPr kumimoji="1" lang="en-US" altLang="ja-JP" sz="1400" dirty="0">
+                  <a:solidFill>
+                    <a:schemeClr val="tx1"/>
+                  </a:solidFill>
+                </a:rPr>
+                <a:t>Release</a:t>
+              </a:r>
+              <a:endParaRPr kumimoji="1" lang="ja-JP" altLang="en-US" sz="1400" dirty="0">
+                <a:solidFill>
+                  <a:schemeClr val="tx1"/>
+                </a:solidFill>
+              </a:endParaRPr>
+            </a:p>
+          </p:txBody>
+        </p:sp>
+        <p:sp>
+          <p:nvSpPr>
+            <p:cNvPr id="165" name="四角形: 角を丸くする 52"/>
+            <p:cNvSpPr/>
+            <p:nvPr/>
+          </p:nvSpPr>
+          <p:spPr>
+            <a:xfrm>
+              <a:off x="6084168" y="2513856"/>
+              <a:ext cx="1163091" cy="381000"/>
+            </a:xfrm>
+            <a:prstGeom prst="roundRect">
+              <a:avLst/>
+            </a:prstGeom>
+            <a:solidFill>
+              <a:srgbClr val="FFFF00"/>
+            </a:solidFill>
+          </p:spPr>
+          <p:style>
+            <a:lnRef idx="2">
+              <a:schemeClr val="accent1">
+                <a:shade val="50000"/>
+              </a:schemeClr>
+            </a:lnRef>
+            <a:fillRef idx="1">
+              <a:schemeClr val="accent1"/>
+            </a:fillRef>
+            <a:effectRef idx="0">
+              <a:schemeClr val="accent1"/>
+            </a:effectRef>
+            <a:fontRef idx="minor">
+              <a:schemeClr val="lt1"/>
+            </a:fontRef>
+          </p:style>
+          <p:txBody>
+            <a:bodyPr rtlCol="0" anchor="ctr"/>
+            <a:lstStyle/>
+            <a:p>
+              <a:pPr algn="ctr"/>
+              <a:r>
+                <a:rPr kumimoji="1" lang="en-US" altLang="ja-JP" sz="1400" dirty="0">
+                  <a:solidFill>
+                    <a:schemeClr val="tx1"/>
+                  </a:solidFill>
+                </a:rPr>
+                <a:t>Support</a:t>
+              </a:r>
+              <a:endParaRPr kumimoji="1" lang="ja-JP" altLang="en-US" sz="1400" dirty="0">
+                <a:solidFill>
+                  <a:schemeClr val="tx1"/>
+                </a:solidFill>
+              </a:endParaRPr>
+            </a:p>
+          </p:txBody>
+        </p:sp>
+        <p:sp>
+          <p:nvSpPr>
+            <p:cNvPr id="72" name="テキスト ボックス 71">
+              <a:extLst>
+                <a:ext uri="{FF2B5EF4-FFF2-40B4-BE49-F238E27FC236}">
+                  <a16:creationId xmlns:a16="http://schemas.microsoft.com/office/drawing/2014/main" id="{489BD1CF-0933-4C76-BC6B-8C1BD0A22F65}"/>
+                </a:ext>
+              </a:extLst>
+            </p:cNvPr>
+            <p:cNvSpPr txBox="1"/>
+            <p:nvPr/>
+          </p:nvSpPr>
+          <p:spPr>
+            <a:xfrm>
+              <a:off x="2224588" y="2951899"/>
+              <a:ext cx="1043876" cy="523220"/>
+            </a:xfrm>
+            <a:prstGeom prst="rect">
+              <a:avLst/>
+            </a:prstGeom>
+            <a:noFill/>
+          </p:spPr>
+          <p:txBody>
+            <a:bodyPr wrap="none" rtlCol="0">
+              <a:spAutoFit/>
+            </a:bodyPr>
+            <a:lstStyle/>
+            <a:p>
+              <a:r>
+                <a:rPr kumimoji="1" lang="en-US" altLang="ja-JP" sz="1400" dirty="0"/>
+                <a:t>OSS +</a:t>
+              </a:r>
+            </a:p>
+            <a:p>
+              <a:r>
+                <a:rPr kumimoji="1" lang="en-US" altLang="ja-JP" sz="1400" dirty="0"/>
+                <a:t>OSS</a:t>
+              </a:r>
+              <a:r>
+                <a:rPr kumimoji="1" lang="ja-JP" altLang="en-US" sz="1400" dirty="0"/>
+                <a:t> </a:t>
+              </a:r>
+              <a:r>
+                <a:rPr kumimoji="1" lang="en-US" altLang="ja-JP" sz="1400" dirty="0"/>
+                <a:t>License</a:t>
+              </a:r>
+              <a:endParaRPr kumimoji="1" lang="ja-JP" altLang="en-US" sz="1400" dirty="0"/>
+            </a:p>
+          </p:txBody>
+        </p:sp>
+      </p:grpSp>
+      <p:grpSp>
+        <p:nvGrpSpPr>
+          <p:cNvPr id="15" name="グループ化 14">
+            <a:extLst>
+              <a:ext uri="{FF2B5EF4-FFF2-40B4-BE49-F238E27FC236}">
+                <a16:creationId xmlns:a16="http://schemas.microsoft.com/office/drawing/2014/main" id="{31FB021D-61F8-4D0C-A2C2-8CE6D4BB6139}"/>
+              </a:ext>
+            </a:extLst>
+          </p:cNvPr>
+          <p:cNvGrpSpPr/>
+          <p:nvPr/>
+        </p:nvGrpSpPr>
+        <p:grpSpPr>
+          <a:xfrm>
+            <a:off x="251521" y="4916611"/>
+            <a:ext cx="8733050" cy="1557685"/>
+            <a:chOff x="251521" y="4916611"/>
+            <a:chExt cx="8733050" cy="1557685"/>
+          </a:xfrm>
+        </p:grpSpPr>
+        <p:sp>
+          <p:nvSpPr>
+            <p:cNvPr id="109" name="テキスト ボックス 108"/>
+            <p:cNvSpPr txBox="1"/>
+            <p:nvPr/>
+          </p:nvSpPr>
+          <p:spPr>
+            <a:xfrm>
+              <a:off x="251521" y="5301208"/>
+              <a:ext cx="1227336" cy="381000"/>
+            </a:xfrm>
+            <a:prstGeom prst="rect">
+              <a:avLst/>
+            </a:prstGeom>
+            <a:noFill/>
+          </p:spPr>
+          <p:txBody>
+            <a:bodyPr wrap="square" rtlCol="0">
+              <a:spAutoFit/>
+            </a:bodyPr>
+            <a:lstStyle/>
+            <a:p>
+              <a:r>
+                <a:rPr lang="en-US" altLang="ja-JP" dirty="0"/>
+                <a:t>IT-4</a:t>
+              </a:r>
+              <a:endParaRPr kumimoji="1" lang="ja-JP" altLang="en-US" dirty="0"/>
+            </a:p>
+          </p:txBody>
+        </p:sp>
+        <p:sp>
+          <p:nvSpPr>
+            <p:cNvPr id="122" name="四角形: 角を丸くする 2"/>
+            <p:cNvSpPr/>
+            <p:nvPr/>
+          </p:nvSpPr>
+          <p:spPr>
+            <a:xfrm>
+              <a:off x="3124200" y="4941168"/>
+              <a:ext cx="3619004" cy="741040"/>
+            </a:xfrm>
+            <a:prstGeom prst="roundRect">
+              <a:avLst/>
+            </a:prstGeom>
+            <a:solidFill>
+              <a:schemeClr val="accent1">
+                <a:lumMod val="60000"/>
+                <a:lumOff val="40000"/>
+              </a:schemeClr>
+            </a:solidFill>
+          </p:spPr>
+          <p:style>
+            <a:lnRef idx="2">
+              <a:schemeClr val="accent1">
+                <a:shade val="50000"/>
+              </a:schemeClr>
+            </a:lnRef>
+            <a:fillRef idx="1">
+              <a:schemeClr val="accent1"/>
+            </a:fillRef>
+            <a:effectRef idx="0">
+              <a:schemeClr val="accent1"/>
+            </a:effectRef>
+            <a:fontRef idx="minor">
+              <a:schemeClr val="lt1"/>
+            </a:fontRef>
+          </p:style>
+          <p:txBody>
+            <a:bodyPr rtlCol="0" anchor="ctr"/>
+            <a:lstStyle/>
+            <a:p>
+              <a:pPr algn="ctr"/>
+              <a:endParaRPr kumimoji="1" lang="ja-JP" altLang="en-US" sz="1400"/>
+            </a:p>
+          </p:txBody>
+        </p:sp>
+        <p:sp>
+          <p:nvSpPr>
+            <p:cNvPr id="123" name="四角形: 角を丸くする 52"/>
+            <p:cNvSpPr/>
+            <p:nvPr/>
+          </p:nvSpPr>
+          <p:spPr>
+            <a:xfrm>
+              <a:off x="4427984" y="5013175"/>
+              <a:ext cx="1729679" cy="592909"/>
+            </a:xfrm>
+            <a:prstGeom prst="roundRect">
+              <a:avLst/>
+            </a:prstGeom>
+            <a:solidFill>
+              <a:srgbClr val="FFFF00"/>
+            </a:solidFill>
+          </p:spPr>
+          <p:style>
+            <a:lnRef idx="2">
+              <a:schemeClr val="accent1">
+                <a:shade val="50000"/>
+              </a:schemeClr>
+            </a:lnRef>
+            <a:fillRef idx="1">
+              <a:schemeClr val="accent1"/>
+            </a:fillRef>
+            <a:effectRef idx="0">
+              <a:schemeClr val="accent1"/>
+            </a:effectRef>
+            <a:fontRef idx="minor">
+              <a:schemeClr val="lt1"/>
+            </a:fontRef>
+          </p:style>
+          <p:txBody>
+            <a:bodyPr rtlCol="0" anchor="ctr"/>
+            <a:lstStyle/>
+            <a:p>
+              <a:pPr algn="ctr"/>
+              <a:r>
+                <a:rPr kumimoji="1" lang="en-US" altLang="ja-JP" sz="1400" dirty="0">
+                  <a:solidFill>
+                    <a:schemeClr val="tx1"/>
+                  </a:solidFill>
+                </a:rPr>
+                <a:t>Inbound/</a:t>
+              </a:r>
+              <a:r>
+                <a:rPr kumimoji="1" lang="en-US" altLang="ja-JP" sz="1400" dirty="0" err="1">
+                  <a:solidFill>
+                    <a:schemeClr val="tx1"/>
+                  </a:solidFill>
+                </a:rPr>
+                <a:t>verificaiton</a:t>
+              </a:r>
+              <a:r>
+                <a:rPr kumimoji="1" lang="en-US" altLang="ja-JP" sz="1400" dirty="0">
+                  <a:solidFill>
+                    <a:schemeClr val="tx1"/>
+                  </a:solidFill>
+                </a:rPr>
+                <a:t>/release</a:t>
+              </a:r>
+              <a:endParaRPr kumimoji="1" lang="ja-JP" altLang="en-US" sz="1400" dirty="0">
+                <a:solidFill>
+                  <a:schemeClr val="tx1"/>
+                </a:solidFill>
+              </a:endParaRPr>
+            </a:p>
+          </p:txBody>
+        </p:sp>
+        <p:sp>
+          <p:nvSpPr>
+            <p:cNvPr id="124" name="四角形: 角を丸くする 48"/>
+            <p:cNvSpPr/>
+            <p:nvPr/>
+          </p:nvSpPr>
+          <p:spPr>
+            <a:xfrm>
+              <a:off x="1157935" y="5885504"/>
+              <a:ext cx="1163091" cy="381000"/>
+            </a:xfrm>
+            <a:prstGeom prst="roundRect">
+              <a:avLst/>
+            </a:prstGeom>
+            <a:solidFill>
+              <a:schemeClr val="accent3">
+                <a:lumMod val="50000"/>
+              </a:schemeClr>
+            </a:solidFill>
+            <a:ln>
+              <a:solidFill>
+                <a:schemeClr val="accent3">
+                  <a:lumMod val="50000"/>
+                </a:schemeClr>
+              </a:solidFill>
+            </a:ln>
+          </p:spPr>
+          <p:style>
+            <a:lnRef idx="2">
+              <a:schemeClr val="accent1">
+                <a:shade val="50000"/>
+              </a:schemeClr>
+            </a:lnRef>
+            <a:fillRef idx="1">
+              <a:schemeClr val="accent1"/>
+            </a:fillRef>
+            <a:effectRef idx="0">
+              <a:schemeClr val="accent1"/>
+            </a:effectRef>
+            <a:fontRef idx="minor">
+              <a:schemeClr val="lt1"/>
+            </a:fontRef>
+          </p:style>
+          <p:txBody>
+            <a:bodyPr rtlCol="0" anchor="ctr"/>
+            <a:lstStyle/>
+            <a:p>
+              <a:pPr algn="ctr"/>
+              <a:r>
+                <a:rPr lang="en-US" altLang="ja-JP" sz="1400" dirty="0">
+                  <a:solidFill>
+                    <a:schemeClr val="bg1"/>
+                  </a:solidFill>
+                </a:rPr>
+                <a:t>Community</a:t>
+              </a:r>
+              <a:endParaRPr kumimoji="1" lang="ja-JP" altLang="en-US" sz="1400" dirty="0">
+                <a:solidFill>
+                  <a:schemeClr val="bg1"/>
+                </a:solidFill>
+              </a:endParaRPr>
+            </a:p>
+          </p:txBody>
+        </p:sp>
+        <p:cxnSp>
+          <p:nvCxnSpPr>
+            <p:cNvPr id="125" name="直線矢印コネクタ 124"/>
+            <p:cNvCxnSpPr>
+              <a:cxnSpLocks/>
+              <a:stCxn id="124" idx="0"/>
+              <a:endCxn id="128" idx="2"/>
+            </p:cNvCxnSpPr>
+            <p:nvPr/>
+          </p:nvCxnSpPr>
+          <p:spPr>
+            <a:xfrm flipH="1" flipV="1">
+              <a:off x="1738341" y="5550319"/>
+              <a:ext cx="1140" cy="335185"/>
+            </a:xfrm>
+            <a:prstGeom prst="straightConnector1">
+              <a:avLst/>
+            </a:prstGeom>
+            <a:ln w="38100">
+              <a:solidFill>
+                <a:schemeClr val="tx1"/>
+              </a:solidFill>
+              <a:tailEnd type="triangle"/>
+            </a:ln>
+          </p:spPr>
+          <p:style>
+            <a:lnRef idx="1">
+              <a:schemeClr val="accent1"/>
+            </a:lnRef>
+            <a:fillRef idx="0">
+              <a:schemeClr val="accent1"/>
+            </a:fillRef>
+            <a:effectRef idx="0">
+              <a:schemeClr val="accent1"/>
+            </a:effectRef>
+            <a:fontRef idx="minor">
+              <a:schemeClr val="tx1"/>
+            </a:fontRef>
+          </p:style>
+        </p:cxnSp>
+        <p:cxnSp>
+          <p:nvCxnSpPr>
+            <p:cNvPr id="127" name="直線矢印コネクタ 126"/>
+            <p:cNvCxnSpPr>
+              <a:cxnSpLocks/>
+              <a:stCxn id="123" idx="3"/>
+              <a:endCxn id="134" idx="1"/>
+            </p:cNvCxnSpPr>
+            <p:nvPr/>
+          </p:nvCxnSpPr>
+          <p:spPr>
+            <a:xfrm flipV="1">
+              <a:off x="6157663" y="5309629"/>
+              <a:ext cx="1663817" cy="1"/>
+            </a:xfrm>
+            <a:prstGeom prst="straightConnector1">
+              <a:avLst/>
+            </a:prstGeom>
+            <a:ln w="38100">
+              <a:solidFill>
+                <a:schemeClr val="tx1"/>
+              </a:solidFill>
+              <a:headEnd type="none" w="med" len="med"/>
+              <a:tailEnd type="triangle" w="med" len="med"/>
+            </a:ln>
+          </p:spPr>
+          <p:style>
+            <a:lnRef idx="1">
+              <a:schemeClr val="accent1"/>
+            </a:lnRef>
+            <a:fillRef idx="0">
+              <a:schemeClr val="accent1"/>
+            </a:fillRef>
+            <a:effectRef idx="0">
+              <a:schemeClr val="accent1"/>
+            </a:effectRef>
+            <a:fontRef idx="minor">
+              <a:schemeClr val="tx1"/>
+            </a:fontRef>
+          </p:style>
+        </p:cxnSp>
+        <p:sp>
+          <p:nvSpPr>
+            <p:cNvPr id="128" name="四角形: 角を丸くする 9"/>
+            <p:cNvSpPr/>
+            <p:nvPr/>
+          </p:nvSpPr>
+          <p:spPr>
+            <a:xfrm>
+              <a:off x="1155655" y="5094016"/>
+              <a:ext cx="1165371" cy="456303"/>
+            </a:xfrm>
+            <a:prstGeom prst="roundRect">
+              <a:avLst/>
+            </a:prstGeom>
+            <a:solidFill>
+              <a:schemeClr val="accent3">
+                <a:lumMod val="50000"/>
+              </a:schemeClr>
+            </a:solidFill>
+            <a:ln>
+              <a:solidFill>
+                <a:schemeClr val="accent3">
+                  <a:lumMod val="50000"/>
+                </a:schemeClr>
+              </a:solidFill>
+            </a:ln>
+          </p:spPr>
+          <p:style>
+            <a:lnRef idx="2">
+              <a:schemeClr val="accent1">
+                <a:shade val="50000"/>
+              </a:schemeClr>
+            </a:lnRef>
+            <a:fillRef idx="1">
+              <a:schemeClr val="accent1"/>
+            </a:fillRef>
+            <a:effectRef idx="0">
+              <a:schemeClr val="accent1"/>
+            </a:effectRef>
+            <a:fontRef idx="minor">
+              <a:schemeClr val="lt1"/>
+            </a:fontRef>
+          </p:style>
+          <p:txBody>
+            <a:bodyPr rtlCol="0" anchor="ctr"/>
+            <a:lstStyle/>
+            <a:p>
+              <a:pPr algn="ctr"/>
+              <a:r>
+                <a:rPr lang="en-US" altLang="ja-JP" sz="1400" dirty="0">
+                  <a:solidFill>
+                    <a:schemeClr val="bg1"/>
+                  </a:solidFill>
+                </a:rPr>
+                <a:t>Hardware</a:t>
+              </a:r>
+              <a:r>
+                <a:rPr lang="ja-JP" altLang="en-US" sz="1400" dirty="0">
+                  <a:solidFill>
+                    <a:schemeClr val="bg1"/>
+                  </a:solidFill>
+                </a:rPr>
+                <a:t> </a:t>
+              </a:r>
+              <a:r>
+                <a:rPr lang="en-US" altLang="ja-JP" sz="1400" dirty="0">
+                  <a:solidFill>
+                    <a:schemeClr val="bg1"/>
+                  </a:solidFill>
+                </a:rPr>
+                <a:t>Vendor</a:t>
+              </a:r>
+            </a:p>
+          </p:txBody>
+        </p:sp>
+        <p:cxnSp>
+          <p:nvCxnSpPr>
+            <p:cNvPr id="129" name="直線矢印コネクタ 128"/>
+            <p:cNvCxnSpPr>
+              <a:cxnSpLocks/>
+              <a:stCxn id="128" idx="3"/>
+              <a:endCxn id="123" idx="1"/>
+            </p:cNvCxnSpPr>
+            <p:nvPr/>
+          </p:nvCxnSpPr>
+          <p:spPr>
+            <a:xfrm flipV="1">
+              <a:off x="2321026" y="5309630"/>
+              <a:ext cx="2106958" cy="12538"/>
+            </a:xfrm>
+            <a:prstGeom prst="straightConnector1">
+              <a:avLst/>
+            </a:prstGeom>
+            <a:ln w="38100">
+              <a:solidFill>
+                <a:schemeClr val="tx1"/>
+              </a:solidFill>
+              <a:headEnd type="none" w="med" len="med"/>
+              <a:tailEnd type="triangle" w="med" len="med"/>
+            </a:ln>
+          </p:spPr>
+          <p:style>
+            <a:lnRef idx="1">
+              <a:schemeClr val="accent1"/>
+            </a:lnRef>
+            <a:fillRef idx="0">
+              <a:schemeClr val="accent1"/>
+            </a:fillRef>
+            <a:effectRef idx="0">
+              <a:schemeClr val="accent1"/>
+            </a:effectRef>
+            <a:fontRef idx="minor">
+              <a:schemeClr val="tx1"/>
+            </a:fontRef>
+          </p:style>
+        </p:cxnSp>
+        <p:sp>
+          <p:nvSpPr>
+            <p:cNvPr id="130" name="テキスト ボックス 129"/>
+            <p:cNvSpPr txBox="1"/>
+            <p:nvPr/>
+          </p:nvSpPr>
+          <p:spPr>
+            <a:xfrm>
+              <a:off x="3363073" y="5014391"/>
+              <a:ext cx="848887" cy="307777"/>
+            </a:xfrm>
+            <a:prstGeom prst="rect">
+              <a:avLst/>
+            </a:prstGeom>
+            <a:noFill/>
+          </p:spPr>
+          <p:txBody>
+            <a:bodyPr wrap="none" rtlCol="0">
+              <a:spAutoFit/>
+            </a:bodyPr>
+            <a:lstStyle/>
+            <a:p>
+              <a:r>
+                <a:rPr kumimoji="1" lang="en-US" altLang="ja-JP" sz="1400" dirty="0"/>
+                <a:t>Purchase</a:t>
+              </a:r>
+              <a:endParaRPr kumimoji="1" lang="ja-JP" altLang="en-US" sz="1400" dirty="0"/>
+            </a:p>
+          </p:txBody>
+        </p:sp>
+        <p:sp>
+          <p:nvSpPr>
+            <p:cNvPr id="134" name="四角形: 角を丸くする 9"/>
+            <p:cNvSpPr/>
+            <p:nvPr/>
+          </p:nvSpPr>
+          <p:spPr>
+            <a:xfrm>
+              <a:off x="7821480" y="4979782"/>
+              <a:ext cx="1163091" cy="659694"/>
+            </a:xfrm>
+            <a:prstGeom prst="roundRect">
+              <a:avLst/>
+            </a:prstGeom>
+            <a:solidFill>
+              <a:schemeClr val="accent3">
+                <a:lumMod val="50000"/>
+              </a:schemeClr>
+            </a:solidFill>
+            <a:ln>
+              <a:solidFill>
+                <a:schemeClr val="accent3">
+                  <a:lumMod val="50000"/>
+                </a:schemeClr>
+              </a:solidFill>
+            </a:ln>
+          </p:spPr>
+          <p:style>
+            <a:lnRef idx="2">
+              <a:schemeClr val="accent1">
+                <a:shade val="50000"/>
+              </a:schemeClr>
+            </a:lnRef>
+            <a:fillRef idx="1">
+              <a:schemeClr val="accent1"/>
+            </a:fillRef>
+            <a:effectRef idx="0">
+              <a:schemeClr val="accent1"/>
+            </a:effectRef>
+            <a:fontRef idx="minor">
+              <a:schemeClr val="lt1"/>
+            </a:fontRef>
+          </p:style>
+          <p:txBody>
+            <a:bodyPr rtlCol="0" anchor="ctr"/>
+            <a:lstStyle/>
+            <a:p>
+              <a:pPr algn="ctr"/>
+              <a:r>
+                <a:rPr lang="en-US" altLang="ja-JP" sz="1400" dirty="0">
+                  <a:solidFill>
+                    <a:schemeClr val="bg1"/>
+                  </a:solidFill>
+                </a:rPr>
+                <a:t>Customer</a:t>
+              </a:r>
+              <a:r>
+                <a:rPr lang="ja-JP" altLang="en-US" sz="1400" dirty="0">
+                  <a:solidFill>
+                    <a:schemeClr val="bg1"/>
+                  </a:solidFill>
+                </a:rPr>
+                <a:t> </a:t>
+              </a:r>
+              <a:r>
+                <a:rPr lang="en-US" altLang="ja-JP" sz="1400" dirty="0">
+                  <a:solidFill>
+                    <a:schemeClr val="bg1"/>
+                  </a:solidFill>
+                </a:rPr>
+                <a:t>Company</a:t>
+              </a:r>
+              <a:endParaRPr kumimoji="1" lang="ja-JP" altLang="en-US" sz="1400" dirty="0">
+                <a:solidFill>
+                  <a:schemeClr val="bg1"/>
+                </a:solidFill>
+              </a:endParaRPr>
+            </a:p>
+          </p:txBody>
+        </p:sp>
+        <p:sp>
+          <p:nvSpPr>
+            <p:cNvPr id="146" name="四角形: 角を丸くする 2"/>
+            <p:cNvSpPr/>
+            <p:nvPr/>
+          </p:nvSpPr>
+          <p:spPr>
+            <a:xfrm>
+              <a:off x="3124200" y="5733256"/>
+              <a:ext cx="3598790" cy="741040"/>
+            </a:xfrm>
+            <a:prstGeom prst="roundRect">
+              <a:avLst/>
+            </a:prstGeom>
+            <a:solidFill>
+              <a:schemeClr val="accent1">
+                <a:lumMod val="60000"/>
+                <a:lumOff val="40000"/>
+              </a:schemeClr>
+            </a:solidFill>
+          </p:spPr>
+          <p:style>
+            <a:lnRef idx="2">
+              <a:schemeClr val="accent1">
+                <a:shade val="50000"/>
+              </a:schemeClr>
+            </a:lnRef>
+            <a:fillRef idx="1">
+              <a:schemeClr val="accent1"/>
+            </a:fillRef>
+            <a:effectRef idx="0">
+              <a:schemeClr val="accent1"/>
+            </a:effectRef>
+            <a:fontRef idx="minor">
+              <a:schemeClr val="lt1"/>
+            </a:fontRef>
+          </p:style>
+          <p:txBody>
+            <a:bodyPr rtlCol="0" anchor="ctr"/>
+            <a:lstStyle/>
+            <a:p>
+              <a:pPr algn="ctr"/>
+              <a:endParaRPr kumimoji="1" lang="ja-JP" altLang="en-US" sz="1400"/>
+            </a:p>
+          </p:txBody>
+        </p:sp>
+        <p:sp>
+          <p:nvSpPr>
+            <p:cNvPr id="147" name="四角形: 角を丸くする 52"/>
+            <p:cNvSpPr/>
+            <p:nvPr/>
+          </p:nvSpPr>
+          <p:spPr>
+            <a:xfrm>
+              <a:off x="4506647" y="5817339"/>
+              <a:ext cx="2087058" cy="516131"/>
+            </a:xfrm>
+            <a:prstGeom prst="roundRect">
+              <a:avLst/>
+            </a:prstGeom>
+            <a:solidFill>
+              <a:srgbClr val="FFFF00"/>
+            </a:solidFill>
+          </p:spPr>
+          <p:style>
+            <a:lnRef idx="2">
+              <a:schemeClr val="accent1">
+                <a:shade val="50000"/>
+              </a:schemeClr>
+            </a:lnRef>
+            <a:fillRef idx="1">
+              <a:schemeClr val="accent1"/>
+            </a:fillRef>
+            <a:effectRef idx="0">
+              <a:schemeClr val="accent1"/>
+            </a:effectRef>
+            <a:fontRef idx="minor">
+              <a:schemeClr val="lt1"/>
+            </a:fontRef>
+          </p:style>
+          <p:txBody>
+            <a:bodyPr rtlCol="0" anchor="ctr"/>
+            <a:lstStyle/>
+            <a:p>
+              <a:pPr algn="ctr"/>
+              <a:r>
+                <a:rPr lang="en-US" altLang="ja-JP" sz="1400" dirty="0">
+                  <a:solidFill>
+                    <a:schemeClr val="tx1"/>
+                  </a:solidFill>
+                </a:rPr>
+                <a:t>Planning</a:t>
+              </a:r>
+            </a:p>
+            <a:p>
+              <a:pPr algn="ctr"/>
+              <a:r>
+                <a:rPr lang="en-US" altLang="ja-JP" sz="1400" dirty="0">
+                  <a:solidFill>
+                    <a:schemeClr val="tx1"/>
+                  </a:solidFill>
+                </a:rPr>
+                <a:t>Inbound/ release</a:t>
+              </a:r>
+            </a:p>
+          </p:txBody>
+        </p:sp>
+        <p:sp>
+          <p:nvSpPr>
+            <p:cNvPr id="148" name="テキスト ボックス 147"/>
+            <p:cNvSpPr txBox="1"/>
+            <p:nvPr/>
+          </p:nvSpPr>
+          <p:spPr>
+            <a:xfrm>
+              <a:off x="3635896" y="6011996"/>
+              <a:ext cx="721672" cy="307777"/>
+            </a:xfrm>
+            <a:prstGeom prst="rect">
+              <a:avLst/>
+            </a:prstGeom>
+            <a:noFill/>
+          </p:spPr>
+          <p:txBody>
+            <a:bodyPr wrap="none" rtlCol="0">
+              <a:spAutoFit/>
+            </a:bodyPr>
+            <a:lstStyle/>
+            <a:p>
+              <a:r>
+                <a:rPr kumimoji="1" lang="en-US" altLang="ja-JP" sz="1400" dirty="0"/>
+                <a:t>License</a:t>
+              </a:r>
+              <a:endParaRPr kumimoji="1" lang="ja-JP" altLang="en-US" sz="1400" dirty="0"/>
+            </a:p>
+          </p:txBody>
+        </p:sp>
+        <p:sp>
+          <p:nvSpPr>
+            <p:cNvPr id="149" name="テキスト ボックス 148"/>
+            <p:cNvSpPr txBox="1"/>
+            <p:nvPr/>
+          </p:nvSpPr>
+          <p:spPr>
+            <a:xfrm>
+              <a:off x="6739701" y="4916611"/>
+              <a:ext cx="439544" cy="307777"/>
+            </a:xfrm>
+            <a:prstGeom prst="rect">
+              <a:avLst/>
+            </a:prstGeom>
+            <a:noFill/>
+          </p:spPr>
+          <p:txBody>
+            <a:bodyPr wrap="none" rtlCol="0">
+              <a:spAutoFit/>
+            </a:bodyPr>
+            <a:lstStyle/>
+            <a:p>
+              <a:r>
+                <a:rPr lang="en-US" altLang="ja-JP" sz="1400" dirty="0"/>
+                <a:t>Sell</a:t>
+              </a:r>
+              <a:endParaRPr kumimoji="1" lang="ja-JP" altLang="en-US" sz="1400" dirty="0"/>
+            </a:p>
+          </p:txBody>
+        </p:sp>
+        <p:cxnSp>
+          <p:nvCxnSpPr>
+            <p:cNvPr id="150" name="直線矢印コネクタ 149"/>
+            <p:cNvCxnSpPr>
+              <a:cxnSpLocks/>
+              <a:stCxn id="128" idx="3"/>
+              <a:endCxn id="147" idx="1"/>
+            </p:cNvCxnSpPr>
+            <p:nvPr/>
+          </p:nvCxnSpPr>
+          <p:spPr>
+            <a:xfrm>
+              <a:off x="2321026" y="5322168"/>
+              <a:ext cx="2185621" cy="753237"/>
+            </a:xfrm>
+            <a:prstGeom prst="straightConnector1">
+              <a:avLst/>
+            </a:prstGeom>
+            <a:ln w="38100">
+              <a:solidFill>
+                <a:schemeClr val="tx1"/>
+              </a:solidFill>
+              <a:headEnd type="none" w="med" len="med"/>
+              <a:tailEnd type="triangle" w="med" len="med"/>
+            </a:ln>
+          </p:spPr>
+          <p:style>
+            <a:lnRef idx="1">
+              <a:schemeClr val="accent1"/>
+            </a:lnRef>
+            <a:fillRef idx="0">
+              <a:schemeClr val="accent1"/>
+            </a:fillRef>
+            <a:effectRef idx="0">
+              <a:schemeClr val="accent1"/>
+            </a:effectRef>
+            <a:fontRef idx="minor">
+              <a:schemeClr val="tx1"/>
+            </a:fontRef>
+          </p:style>
+        </p:cxnSp>
+        <p:cxnSp>
+          <p:nvCxnSpPr>
+            <p:cNvPr id="160" name="直線矢印コネクタ 159"/>
+            <p:cNvCxnSpPr>
+              <a:cxnSpLocks/>
+              <a:stCxn id="147" idx="3"/>
+              <a:endCxn id="134" idx="1"/>
+            </p:cNvCxnSpPr>
+            <p:nvPr/>
+          </p:nvCxnSpPr>
+          <p:spPr>
+            <a:xfrm flipV="1">
+              <a:off x="6593705" y="5309629"/>
+              <a:ext cx="1227775" cy="765776"/>
+            </a:xfrm>
+            <a:prstGeom prst="straightConnector1">
+              <a:avLst/>
+            </a:prstGeom>
+            <a:ln w="38100">
+              <a:solidFill>
+                <a:schemeClr val="tx1"/>
+              </a:solidFill>
+              <a:headEnd type="none" w="med" len="med"/>
+              <a:tailEnd type="triangle" w="med" len="med"/>
+            </a:ln>
+          </p:spPr>
+          <p:style>
+            <a:lnRef idx="1">
+              <a:schemeClr val="accent1"/>
+            </a:lnRef>
+            <a:fillRef idx="0">
+              <a:schemeClr val="accent1"/>
+            </a:fillRef>
+            <a:effectRef idx="0">
+              <a:schemeClr val="accent1"/>
+            </a:effectRef>
+            <a:fontRef idx="minor">
+              <a:schemeClr val="tx1"/>
+            </a:fontRef>
+          </p:style>
+        </p:cxnSp>
+        <p:sp>
+          <p:nvSpPr>
+            <p:cNvPr id="163" name="テキスト ボックス 162"/>
+            <p:cNvSpPr txBox="1"/>
+            <p:nvPr/>
+          </p:nvSpPr>
+          <p:spPr>
+            <a:xfrm>
+              <a:off x="6993669" y="5856312"/>
+              <a:ext cx="439544" cy="307777"/>
+            </a:xfrm>
+            <a:prstGeom prst="rect">
+              <a:avLst/>
+            </a:prstGeom>
+            <a:noFill/>
+          </p:spPr>
+          <p:txBody>
+            <a:bodyPr wrap="none" rtlCol="0">
+              <a:spAutoFit/>
+            </a:bodyPr>
+            <a:lstStyle/>
+            <a:p>
+              <a:r>
+                <a:rPr lang="en-US" altLang="ja-JP" sz="1400" dirty="0"/>
+                <a:t>Sell</a:t>
+              </a:r>
+              <a:endParaRPr kumimoji="1" lang="ja-JP" altLang="en-US" sz="1400" dirty="0"/>
+            </a:p>
+          </p:txBody>
+        </p:sp>
+        <p:sp>
+          <p:nvSpPr>
+            <p:cNvPr id="75" name="テキスト ボックス 74">
+              <a:extLst>
+                <a:ext uri="{FF2B5EF4-FFF2-40B4-BE49-F238E27FC236}">
+                  <a16:creationId xmlns:a16="http://schemas.microsoft.com/office/drawing/2014/main" id="{3D9705F4-325B-4B36-B9FB-8E892C59B05C}"/>
+                </a:ext>
+              </a:extLst>
+            </p:cNvPr>
+            <p:cNvSpPr txBox="1"/>
+            <p:nvPr/>
+          </p:nvSpPr>
+          <p:spPr>
+            <a:xfrm>
+              <a:off x="2285927" y="5799987"/>
+              <a:ext cx="1043876" cy="523220"/>
+            </a:xfrm>
+            <a:prstGeom prst="rect">
+              <a:avLst/>
+            </a:prstGeom>
+            <a:noFill/>
+          </p:spPr>
+          <p:txBody>
+            <a:bodyPr wrap="none" rtlCol="0">
+              <a:spAutoFit/>
+            </a:bodyPr>
+            <a:lstStyle/>
+            <a:p>
+              <a:r>
+                <a:rPr kumimoji="1" lang="en-US" altLang="ja-JP" sz="1400" dirty="0"/>
+                <a:t>OSS +</a:t>
+              </a:r>
+            </a:p>
+            <a:p>
+              <a:r>
+                <a:rPr kumimoji="1" lang="en-US" altLang="ja-JP" sz="1400" dirty="0"/>
+                <a:t>OSS</a:t>
+              </a:r>
+              <a:r>
+                <a:rPr kumimoji="1" lang="ja-JP" altLang="en-US" sz="1400" dirty="0"/>
+                <a:t> </a:t>
+              </a:r>
+              <a:r>
+                <a:rPr kumimoji="1" lang="en-US" altLang="ja-JP" sz="1400" dirty="0"/>
+                <a:t>License</a:t>
+              </a:r>
+              <a:endParaRPr kumimoji="1" lang="ja-JP" altLang="en-US" sz="1400" dirty="0"/>
+            </a:p>
+          </p:txBody>
+        </p:sp>
+      </p:grpSp>
+      <p:grpSp>
+        <p:nvGrpSpPr>
+          <p:cNvPr id="14" name="グループ化 13">
+            <a:extLst>
+              <a:ext uri="{FF2B5EF4-FFF2-40B4-BE49-F238E27FC236}">
+                <a16:creationId xmlns:a16="http://schemas.microsoft.com/office/drawing/2014/main" id="{FBC2D373-6681-43CA-A41C-1757171EE411}"/>
+              </a:ext>
+            </a:extLst>
+          </p:cNvPr>
+          <p:cNvGrpSpPr/>
+          <p:nvPr/>
+        </p:nvGrpSpPr>
+        <p:grpSpPr>
+          <a:xfrm>
+            <a:off x="323528" y="3413882"/>
+            <a:ext cx="8643040" cy="1466102"/>
+            <a:chOff x="323528" y="3413882"/>
+            <a:chExt cx="8643040" cy="1466102"/>
+          </a:xfrm>
+        </p:grpSpPr>
+        <p:sp>
+          <p:nvSpPr>
+            <p:cNvPr id="104" name="テキスト ボックス 103"/>
+            <p:cNvSpPr txBox="1"/>
+            <p:nvPr/>
+          </p:nvSpPr>
+          <p:spPr>
+            <a:xfrm>
+              <a:off x="323528" y="3645024"/>
+              <a:ext cx="1177331" cy="381000"/>
+            </a:xfrm>
+            <a:prstGeom prst="rect">
+              <a:avLst/>
+            </a:prstGeom>
+            <a:noFill/>
+          </p:spPr>
+          <p:txBody>
+            <a:bodyPr wrap="square" rtlCol="0">
+              <a:spAutoFit/>
+            </a:bodyPr>
+            <a:lstStyle/>
+            <a:p>
+              <a:r>
+                <a:rPr kumimoji="1" lang="en-US" altLang="ja-JP" dirty="0"/>
+                <a:t>IT-3</a:t>
+              </a:r>
+              <a:endParaRPr kumimoji="1" lang="ja-JP" altLang="en-US" dirty="0"/>
+            </a:p>
+          </p:txBody>
+        </p:sp>
+        <p:sp>
+          <p:nvSpPr>
+            <p:cNvPr id="105" name="四角形: 角を丸くする 2"/>
+            <p:cNvSpPr/>
+            <p:nvPr/>
+          </p:nvSpPr>
+          <p:spPr>
+            <a:xfrm>
+              <a:off x="3124200" y="3429000"/>
+              <a:ext cx="3619004" cy="795278"/>
+            </a:xfrm>
+            <a:prstGeom prst="roundRect">
+              <a:avLst/>
+            </a:prstGeom>
+            <a:solidFill>
+              <a:schemeClr val="accent1">
+                <a:lumMod val="60000"/>
+                <a:lumOff val="40000"/>
+              </a:schemeClr>
+            </a:solidFill>
+          </p:spPr>
+          <p:style>
+            <a:lnRef idx="2">
+              <a:schemeClr val="accent1">
+                <a:shade val="50000"/>
+              </a:schemeClr>
+            </a:lnRef>
+            <a:fillRef idx="1">
+              <a:schemeClr val="accent1"/>
+            </a:fillRef>
+            <a:effectRef idx="0">
+              <a:schemeClr val="accent1"/>
+            </a:effectRef>
+            <a:fontRef idx="minor">
+              <a:schemeClr val="lt1"/>
+            </a:fontRef>
+          </p:style>
+          <p:txBody>
+            <a:bodyPr rtlCol="0" anchor="ctr"/>
+            <a:lstStyle/>
+            <a:p>
+              <a:pPr algn="ctr"/>
+              <a:endParaRPr kumimoji="1" lang="ja-JP" altLang="en-US" sz="1400"/>
+            </a:p>
+          </p:txBody>
+        </p:sp>
+        <p:sp>
+          <p:nvSpPr>
+            <p:cNvPr id="108" name="四角形: 角を丸くする 52"/>
+            <p:cNvSpPr/>
+            <p:nvPr/>
+          </p:nvSpPr>
+          <p:spPr>
+            <a:xfrm>
+              <a:off x="4251001" y="3501008"/>
+              <a:ext cx="1844130" cy="674738"/>
+            </a:xfrm>
+            <a:prstGeom prst="roundRect">
+              <a:avLst/>
+            </a:prstGeom>
+            <a:solidFill>
+              <a:srgbClr val="FFFF00"/>
+            </a:solidFill>
+          </p:spPr>
+          <p:style>
+            <a:lnRef idx="2">
+              <a:schemeClr val="accent1">
+                <a:shade val="50000"/>
+              </a:schemeClr>
+            </a:lnRef>
+            <a:fillRef idx="1">
+              <a:schemeClr val="accent1"/>
+            </a:fillRef>
+            <a:effectRef idx="0">
+              <a:schemeClr val="accent1"/>
+            </a:effectRef>
+            <a:fontRef idx="minor">
+              <a:schemeClr val="lt1"/>
+            </a:fontRef>
+          </p:style>
+          <p:txBody>
+            <a:bodyPr rtlCol="0" anchor="ctr"/>
+            <a:lstStyle/>
+            <a:p>
+              <a:r>
+                <a:rPr lang="en-US" altLang="ja-JP" sz="1400" dirty="0">
+                  <a:solidFill>
+                    <a:schemeClr val="tx1"/>
+                  </a:solidFill>
+                </a:rPr>
+                <a:t>Inbound</a:t>
+              </a:r>
+            </a:p>
+            <a:p>
+              <a:r>
+                <a:rPr lang="en-US" altLang="ja-JP" sz="1400" dirty="0">
+                  <a:solidFill>
+                    <a:schemeClr val="tx1"/>
+                  </a:solidFill>
+                </a:rPr>
+                <a:t>Development</a:t>
+              </a:r>
+            </a:p>
+            <a:p>
+              <a:r>
+                <a:rPr lang="en-US" altLang="ja-JP" sz="1400" dirty="0">
+                  <a:solidFill>
+                    <a:schemeClr val="tx1"/>
+                  </a:solidFill>
+                </a:rPr>
+                <a:t>Verification/ Release</a:t>
+              </a:r>
+              <a:endParaRPr lang="ja-JP" altLang="en-US" sz="1400" dirty="0">
+                <a:solidFill>
+                  <a:schemeClr val="tx1"/>
+                </a:solidFill>
+              </a:endParaRPr>
+            </a:p>
+          </p:txBody>
+        </p:sp>
+        <p:sp>
+          <p:nvSpPr>
+            <p:cNvPr id="111" name="四角形: 角を丸くする 48"/>
+            <p:cNvSpPr/>
+            <p:nvPr/>
+          </p:nvSpPr>
+          <p:spPr>
+            <a:xfrm>
+              <a:off x="1108596" y="4369614"/>
+              <a:ext cx="1163091" cy="381000"/>
+            </a:xfrm>
+            <a:prstGeom prst="roundRect">
+              <a:avLst/>
+            </a:prstGeom>
+            <a:solidFill>
+              <a:schemeClr val="accent3">
+                <a:lumMod val="50000"/>
+              </a:schemeClr>
+            </a:solidFill>
+            <a:ln>
+              <a:solidFill>
+                <a:schemeClr val="accent3">
+                  <a:lumMod val="50000"/>
+                </a:schemeClr>
+              </a:solidFill>
+            </a:ln>
+          </p:spPr>
+          <p:style>
+            <a:lnRef idx="2">
+              <a:schemeClr val="accent1">
+                <a:shade val="50000"/>
+              </a:schemeClr>
+            </a:lnRef>
+            <a:fillRef idx="1">
+              <a:schemeClr val="accent1"/>
+            </a:fillRef>
+            <a:effectRef idx="0">
+              <a:schemeClr val="accent1"/>
+            </a:effectRef>
+            <a:fontRef idx="minor">
+              <a:schemeClr val="lt1"/>
+            </a:fontRef>
+          </p:style>
+          <p:txBody>
+            <a:bodyPr rtlCol="0" anchor="ctr"/>
+            <a:lstStyle/>
+            <a:p>
+              <a:pPr algn="ctr"/>
+              <a:r>
+                <a:rPr lang="en-US" altLang="ja-JP" sz="1400" dirty="0">
+                  <a:solidFill>
+                    <a:schemeClr val="bg1"/>
+                  </a:solidFill>
+                </a:rPr>
+                <a:t>Community</a:t>
+              </a:r>
+              <a:endParaRPr kumimoji="1" lang="ja-JP" altLang="en-US" sz="1400" dirty="0">
+                <a:solidFill>
+                  <a:schemeClr val="bg1"/>
+                </a:solidFill>
+              </a:endParaRPr>
+            </a:p>
+          </p:txBody>
+        </p:sp>
+        <p:cxnSp>
+          <p:nvCxnSpPr>
+            <p:cNvPr id="112" name="直線矢印コネクタ 111"/>
+            <p:cNvCxnSpPr>
+              <a:cxnSpLocks/>
+              <a:stCxn id="111" idx="0"/>
+              <a:endCxn id="116" idx="2"/>
+            </p:cNvCxnSpPr>
+            <p:nvPr/>
+          </p:nvCxnSpPr>
+          <p:spPr>
+            <a:xfrm flipV="1">
+              <a:off x="1690142" y="4104825"/>
+              <a:ext cx="7120" cy="264789"/>
+            </a:xfrm>
+            <a:prstGeom prst="straightConnector1">
+              <a:avLst/>
+            </a:prstGeom>
+            <a:ln w="38100">
+              <a:solidFill>
+                <a:schemeClr val="tx1"/>
+              </a:solidFill>
+              <a:tailEnd type="triangle"/>
+            </a:ln>
+          </p:spPr>
+          <p:style>
+            <a:lnRef idx="1">
+              <a:schemeClr val="accent1"/>
+            </a:lnRef>
+            <a:fillRef idx="0">
+              <a:schemeClr val="accent1"/>
+            </a:fillRef>
+            <a:effectRef idx="0">
+              <a:schemeClr val="accent1"/>
+            </a:effectRef>
+            <a:fontRef idx="minor">
+              <a:schemeClr val="tx1"/>
+            </a:fontRef>
+          </p:style>
+        </p:cxnSp>
+        <p:sp>
+          <p:nvSpPr>
+            <p:cNvPr id="113" name="四角形: 角を丸くする 9"/>
+            <p:cNvSpPr/>
+            <p:nvPr/>
+          </p:nvSpPr>
+          <p:spPr>
+            <a:xfrm>
+              <a:off x="7803477" y="3413882"/>
+              <a:ext cx="1163091" cy="789805"/>
+            </a:xfrm>
+            <a:prstGeom prst="roundRect">
+              <a:avLst/>
+            </a:prstGeom>
+            <a:solidFill>
+              <a:schemeClr val="accent3">
+                <a:lumMod val="50000"/>
+              </a:schemeClr>
+            </a:solidFill>
+            <a:ln>
+              <a:solidFill>
+                <a:schemeClr val="accent3">
+                  <a:lumMod val="50000"/>
+                </a:schemeClr>
+              </a:solidFill>
+            </a:ln>
+          </p:spPr>
+          <p:style>
+            <a:lnRef idx="2">
+              <a:schemeClr val="accent1">
+                <a:shade val="50000"/>
+              </a:schemeClr>
+            </a:lnRef>
+            <a:fillRef idx="1">
+              <a:schemeClr val="accent1"/>
+            </a:fillRef>
+            <a:effectRef idx="0">
+              <a:schemeClr val="accent1"/>
+            </a:effectRef>
+            <a:fontRef idx="minor">
+              <a:schemeClr val="lt1"/>
+            </a:fontRef>
+          </p:style>
+          <p:txBody>
+            <a:bodyPr rtlCol="0" anchor="ctr"/>
+            <a:lstStyle/>
+            <a:p>
+              <a:pPr algn="ctr"/>
+              <a:r>
+                <a:rPr lang="en-US" altLang="ja-JP" sz="1400" dirty="0">
+                  <a:solidFill>
+                    <a:schemeClr val="bg1"/>
+                  </a:solidFill>
+                </a:rPr>
+                <a:t>Customer</a:t>
+              </a:r>
+              <a:r>
+                <a:rPr lang="ja-JP" altLang="en-US" sz="1400" dirty="0">
+                  <a:solidFill>
+                    <a:schemeClr val="bg1"/>
+                  </a:solidFill>
+                </a:rPr>
+                <a:t> </a:t>
+              </a:r>
+              <a:r>
+                <a:rPr lang="en-US" altLang="ja-JP" sz="1400" dirty="0">
+                  <a:solidFill>
+                    <a:schemeClr val="bg1"/>
+                  </a:solidFill>
+                </a:rPr>
+                <a:t>Company</a:t>
+              </a:r>
+              <a:r>
+                <a:rPr lang="ja-JP" altLang="en-US" sz="1400" dirty="0">
+                  <a:solidFill>
+                    <a:schemeClr val="bg1"/>
+                  </a:solidFill>
+                </a:rPr>
+                <a:t> </a:t>
+              </a:r>
+              <a:r>
+                <a:rPr lang="en-US" altLang="ja-JP" sz="1100" dirty="0">
+                  <a:solidFill>
+                    <a:schemeClr val="bg1"/>
+                  </a:solidFill>
+                </a:rPr>
+                <a:t>(Brand</a:t>
+              </a:r>
+              <a:r>
+                <a:rPr lang="ja-JP" altLang="en-US" sz="1100" dirty="0">
+                  <a:solidFill>
+                    <a:schemeClr val="bg1"/>
+                  </a:solidFill>
+                </a:rPr>
+                <a:t> </a:t>
+              </a:r>
+              <a:r>
+                <a:rPr lang="en-US" altLang="ja-JP" sz="1100" dirty="0">
+                  <a:solidFill>
+                    <a:schemeClr val="bg1"/>
+                  </a:solidFill>
+                </a:rPr>
+                <a:t>Owner)</a:t>
+              </a:r>
+              <a:endParaRPr kumimoji="1" lang="en-US" altLang="ja-JP" sz="1100" dirty="0">
+                <a:solidFill>
+                  <a:schemeClr val="bg1"/>
+                </a:solidFill>
+              </a:endParaRPr>
+            </a:p>
+          </p:txBody>
+        </p:sp>
+        <p:cxnSp>
+          <p:nvCxnSpPr>
+            <p:cNvPr id="114" name="直線矢印コネクタ 113"/>
+            <p:cNvCxnSpPr>
+              <a:stCxn id="108" idx="3"/>
+              <a:endCxn id="113" idx="1"/>
+            </p:cNvCxnSpPr>
+            <p:nvPr/>
+          </p:nvCxnSpPr>
+          <p:spPr>
+            <a:xfrm flipV="1">
+              <a:off x="6095131" y="3808785"/>
+              <a:ext cx="1708346" cy="29592"/>
+            </a:xfrm>
+            <a:prstGeom prst="straightConnector1">
+              <a:avLst/>
+            </a:prstGeom>
+            <a:ln w="38100">
+              <a:solidFill>
+                <a:schemeClr val="tx1"/>
+              </a:solidFill>
+              <a:headEnd type="triangle" w="med" len="med"/>
+              <a:tailEnd type="triangle" w="med" len="med"/>
+            </a:ln>
+          </p:spPr>
+          <p:style>
+            <a:lnRef idx="1">
+              <a:schemeClr val="accent1"/>
+            </a:lnRef>
+            <a:fillRef idx="0">
+              <a:schemeClr val="accent1"/>
+            </a:fillRef>
+            <a:effectRef idx="0">
+              <a:schemeClr val="accent1"/>
+            </a:effectRef>
+            <a:fontRef idx="minor">
+              <a:schemeClr val="tx1"/>
+            </a:fontRef>
+          </p:style>
+        </p:cxnSp>
+        <p:sp>
+          <p:nvSpPr>
+            <p:cNvPr id="116" name="四角形: 角を丸くする 9"/>
+            <p:cNvSpPr/>
+            <p:nvPr/>
+          </p:nvSpPr>
+          <p:spPr>
+            <a:xfrm>
+              <a:off x="1108596" y="3648522"/>
+              <a:ext cx="1177331" cy="456303"/>
+            </a:xfrm>
+            <a:prstGeom prst="roundRect">
+              <a:avLst/>
+            </a:prstGeom>
+            <a:solidFill>
+              <a:schemeClr val="accent3">
+                <a:lumMod val="50000"/>
+              </a:schemeClr>
+            </a:solidFill>
+            <a:ln>
+              <a:solidFill>
+                <a:schemeClr val="accent3">
+                  <a:lumMod val="50000"/>
+                </a:schemeClr>
+              </a:solidFill>
+            </a:ln>
+          </p:spPr>
+          <p:style>
+            <a:lnRef idx="2">
+              <a:schemeClr val="accent1">
+                <a:shade val="50000"/>
+              </a:schemeClr>
+            </a:lnRef>
+            <a:fillRef idx="1">
+              <a:schemeClr val="accent1"/>
+            </a:fillRef>
+            <a:effectRef idx="0">
+              <a:schemeClr val="accent1"/>
+            </a:effectRef>
+            <a:fontRef idx="minor">
+              <a:schemeClr val="lt1"/>
+            </a:fontRef>
+          </p:style>
+          <p:txBody>
+            <a:bodyPr rtlCol="0" anchor="ctr"/>
+            <a:lstStyle/>
+            <a:p>
+              <a:pPr algn="ctr"/>
+              <a:r>
+                <a:rPr lang="en-US" altLang="ja-JP" sz="1400" dirty="0">
+                  <a:solidFill>
+                    <a:schemeClr val="bg1"/>
+                  </a:solidFill>
+                </a:rPr>
+                <a:t>ISV</a:t>
+              </a:r>
+            </a:p>
+          </p:txBody>
+        </p:sp>
+        <p:cxnSp>
+          <p:nvCxnSpPr>
+            <p:cNvPr id="117" name="直線矢印コネクタ 116"/>
+            <p:cNvCxnSpPr>
+              <a:cxnSpLocks/>
+              <a:stCxn id="116" idx="3"/>
+              <a:endCxn id="108" idx="1"/>
+            </p:cNvCxnSpPr>
+            <p:nvPr/>
+          </p:nvCxnSpPr>
+          <p:spPr>
+            <a:xfrm flipV="1">
+              <a:off x="2285927" y="3838377"/>
+              <a:ext cx="1965074" cy="38297"/>
+            </a:xfrm>
+            <a:prstGeom prst="straightConnector1">
+              <a:avLst/>
+            </a:prstGeom>
+            <a:ln w="38100">
+              <a:solidFill>
+                <a:schemeClr val="tx1"/>
+              </a:solidFill>
+              <a:headEnd type="triangle" w="med" len="med"/>
+              <a:tailEnd type="triangle" w="med" len="med"/>
+            </a:ln>
+          </p:spPr>
+          <p:style>
+            <a:lnRef idx="1">
+              <a:schemeClr val="accent1"/>
+            </a:lnRef>
+            <a:fillRef idx="0">
+              <a:schemeClr val="accent1"/>
+            </a:fillRef>
+            <a:effectRef idx="0">
+              <a:schemeClr val="accent1"/>
+            </a:effectRef>
+            <a:fontRef idx="minor">
+              <a:schemeClr val="tx1"/>
+            </a:fontRef>
+          </p:style>
+        </p:cxnSp>
+        <p:sp>
+          <p:nvSpPr>
+            <p:cNvPr id="118" name="テキスト ボックス 117"/>
+            <p:cNvSpPr txBox="1"/>
+            <p:nvPr/>
+          </p:nvSpPr>
+          <p:spPr>
+            <a:xfrm>
+              <a:off x="3318735" y="3568896"/>
+              <a:ext cx="810928" cy="307777"/>
+            </a:xfrm>
+            <a:prstGeom prst="rect">
+              <a:avLst/>
+            </a:prstGeom>
+            <a:noFill/>
+          </p:spPr>
+          <p:txBody>
+            <a:bodyPr wrap="none" rtlCol="0">
+              <a:spAutoFit/>
+            </a:bodyPr>
+            <a:lstStyle/>
+            <a:p>
+              <a:r>
+                <a:rPr lang="en-US" altLang="ja-JP" sz="1400" dirty="0"/>
+                <a:t>Contract</a:t>
+              </a:r>
+              <a:endParaRPr kumimoji="1" lang="ja-JP" altLang="en-US" sz="1400" dirty="0"/>
+            </a:p>
+          </p:txBody>
+        </p:sp>
+        <p:sp>
+          <p:nvSpPr>
+            <p:cNvPr id="119" name="テキスト ボックス 118"/>
+            <p:cNvSpPr txBox="1"/>
+            <p:nvPr/>
+          </p:nvSpPr>
+          <p:spPr>
+            <a:xfrm>
+              <a:off x="6805989" y="3429000"/>
+              <a:ext cx="810928" cy="307777"/>
+            </a:xfrm>
+            <a:prstGeom prst="rect">
+              <a:avLst/>
+            </a:prstGeom>
+            <a:noFill/>
+          </p:spPr>
+          <p:txBody>
+            <a:bodyPr wrap="none" rtlCol="0">
+              <a:spAutoFit/>
+            </a:bodyPr>
+            <a:lstStyle/>
+            <a:p>
+              <a:r>
+                <a:rPr lang="en-US" altLang="ja-JP" sz="1400" dirty="0"/>
+                <a:t>Contract</a:t>
+              </a:r>
+              <a:endParaRPr kumimoji="1" lang="ja-JP" altLang="en-US" sz="1400" dirty="0"/>
+            </a:p>
+          </p:txBody>
+        </p:sp>
+        <p:sp>
+          <p:nvSpPr>
+            <p:cNvPr id="120" name="四角形: 角を丸くする 48"/>
+            <p:cNvSpPr/>
+            <p:nvPr/>
+          </p:nvSpPr>
+          <p:spPr>
+            <a:xfrm>
+              <a:off x="4591520" y="4437799"/>
+              <a:ext cx="1163091" cy="381000"/>
+            </a:xfrm>
+            <a:prstGeom prst="roundRect">
+              <a:avLst/>
+            </a:prstGeom>
+            <a:solidFill>
+              <a:schemeClr val="accent3">
+                <a:lumMod val="50000"/>
+              </a:schemeClr>
+            </a:solidFill>
+            <a:ln>
+              <a:solidFill>
+                <a:schemeClr val="accent3">
+                  <a:lumMod val="50000"/>
+                </a:schemeClr>
+              </a:solidFill>
+            </a:ln>
+          </p:spPr>
+          <p:style>
+            <a:lnRef idx="2">
+              <a:schemeClr val="accent1">
+                <a:shade val="50000"/>
+              </a:schemeClr>
+            </a:lnRef>
+            <a:fillRef idx="1">
+              <a:schemeClr val="accent1"/>
+            </a:fillRef>
+            <a:effectRef idx="0">
+              <a:schemeClr val="accent1"/>
+            </a:effectRef>
+            <a:fontRef idx="minor">
+              <a:schemeClr val="lt1"/>
+            </a:fontRef>
+          </p:style>
+          <p:txBody>
+            <a:bodyPr rtlCol="0" anchor="ctr"/>
+            <a:lstStyle/>
+            <a:p>
+              <a:pPr algn="ctr"/>
+              <a:r>
+                <a:rPr lang="en-US" altLang="ja-JP" sz="1400" dirty="0">
+                  <a:solidFill>
+                    <a:schemeClr val="bg1"/>
+                  </a:solidFill>
+                </a:rPr>
+                <a:t>Community</a:t>
+              </a:r>
+              <a:endParaRPr kumimoji="1" lang="ja-JP" altLang="en-US" sz="1400" dirty="0">
+                <a:solidFill>
+                  <a:schemeClr val="bg1"/>
+                </a:solidFill>
+              </a:endParaRPr>
+            </a:p>
+          </p:txBody>
+        </p:sp>
+        <p:cxnSp>
+          <p:nvCxnSpPr>
+            <p:cNvPr id="121" name="直線矢印コネクタ 120"/>
+            <p:cNvCxnSpPr>
+              <a:stCxn id="120" idx="0"/>
+              <a:endCxn id="108" idx="2"/>
+            </p:cNvCxnSpPr>
+            <p:nvPr/>
+          </p:nvCxnSpPr>
+          <p:spPr>
+            <a:xfrm flipV="1">
+              <a:off x="5173066" y="4175746"/>
+              <a:ext cx="0" cy="262053"/>
+            </a:xfrm>
+            <a:prstGeom prst="straightConnector1">
+              <a:avLst/>
+            </a:prstGeom>
+            <a:ln w="38100">
+              <a:solidFill>
+                <a:schemeClr val="tx1"/>
+              </a:solidFill>
+              <a:tailEnd type="triangle"/>
+            </a:ln>
+          </p:spPr>
+          <p:style>
+            <a:lnRef idx="1">
+              <a:schemeClr val="accent1"/>
+            </a:lnRef>
+            <a:fillRef idx="0">
+              <a:schemeClr val="accent1"/>
+            </a:fillRef>
+            <a:effectRef idx="0">
+              <a:schemeClr val="accent1"/>
+            </a:effectRef>
+            <a:fontRef idx="minor">
+              <a:schemeClr val="tx1"/>
+            </a:fontRef>
+          </p:style>
+        </p:cxnSp>
+        <p:sp>
+          <p:nvSpPr>
+            <p:cNvPr id="141" name="テキスト ボックス 140"/>
+            <p:cNvSpPr txBox="1"/>
+            <p:nvPr/>
+          </p:nvSpPr>
+          <p:spPr>
+            <a:xfrm>
+              <a:off x="3376074" y="3835524"/>
+              <a:ext cx="673582" cy="307777"/>
+            </a:xfrm>
+            <a:prstGeom prst="rect">
+              <a:avLst/>
+            </a:prstGeom>
+            <a:noFill/>
+          </p:spPr>
+          <p:txBody>
+            <a:bodyPr wrap="none" rtlCol="0">
+              <a:spAutoFit/>
+            </a:bodyPr>
+            <a:lstStyle/>
+            <a:p>
+              <a:r>
+                <a:rPr kumimoji="1" lang="en-US" altLang="ja-JP" sz="1400" dirty="0"/>
+                <a:t>Supply</a:t>
+              </a:r>
+              <a:endParaRPr kumimoji="1" lang="ja-JP" altLang="en-US" sz="1400" dirty="0"/>
+            </a:p>
+          </p:txBody>
+        </p:sp>
+        <p:sp>
+          <p:nvSpPr>
+            <p:cNvPr id="142" name="テキスト ボックス 141"/>
+            <p:cNvSpPr txBox="1"/>
+            <p:nvPr/>
+          </p:nvSpPr>
+          <p:spPr>
+            <a:xfrm>
+              <a:off x="6840214" y="3832409"/>
+              <a:ext cx="673582" cy="307777"/>
+            </a:xfrm>
+            <a:prstGeom prst="rect">
+              <a:avLst/>
+            </a:prstGeom>
+            <a:noFill/>
+          </p:spPr>
+          <p:txBody>
+            <a:bodyPr wrap="none" rtlCol="0">
+              <a:spAutoFit/>
+            </a:bodyPr>
+            <a:lstStyle/>
+            <a:p>
+              <a:r>
+                <a:rPr lang="en-US" altLang="ja-JP" sz="1400" dirty="0"/>
+                <a:t>Supply</a:t>
+              </a:r>
+              <a:endParaRPr kumimoji="1" lang="ja-JP" altLang="en-US" sz="1400" dirty="0"/>
+            </a:p>
+          </p:txBody>
+        </p:sp>
+        <p:sp>
+          <p:nvSpPr>
+            <p:cNvPr id="73" name="テキスト ボックス 72">
+              <a:extLst>
+                <a:ext uri="{FF2B5EF4-FFF2-40B4-BE49-F238E27FC236}">
+                  <a16:creationId xmlns:a16="http://schemas.microsoft.com/office/drawing/2014/main" id="{F84B4AE3-0246-41D8-927D-EBB055E35683}"/>
+                </a:ext>
+              </a:extLst>
+            </p:cNvPr>
+            <p:cNvSpPr txBox="1"/>
+            <p:nvPr/>
+          </p:nvSpPr>
+          <p:spPr>
+            <a:xfrm>
+              <a:off x="2264070" y="4286051"/>
+              <a:ext cx="1043876" cy="523220"/>
+            </a:xfrm>
+            <a:prstGeom prst="rect">
+              <a:avLst/>
+            </a:prstGeom>
+            <a:noFill/>
+          </p:spPr>
+          <p:txBody>
+            <a:bodyPr wrap="none" rtlCol="0">
+              <a:spAutoFit/>
+            </a:bodyPr>
+            <a:lstStyle/>
+            <a:p>
+              <a:r>
+                <a:rPr kumimoji="1" lang="en-US" altLang="ja-JP" sz="1400" dirty="0"/>
+                <a:t>OSS +</a:t>
+              </a:r>
+            </a:p>
+            <a:p>
+              <a:r>
+                <a:rPr kumimoji="1" lang="en-US" altLang="ja-JP" sz="1400" dirty="0"/>
+                <a:t>OSS</a:t>
+              </a:r>
+              <a:r>
+                <a:rPr kumimoji="1" lang="ja-JP" altLang="en-US" sz="1400" dirty="0"/>
+                <a:t> </a:t>
+              </a:r>
+              <a:r>
+                <a:rPr kumimoji="1" lang="en-US" altLang="ja-JP" sz="1400" dirty="0"/>
+                <a:t>License</a:t>
+              </a:r>
+              <a:endParaRPr kumimoji="1" lang="ja-JP" altLang="en-US" sz="1400" dirty="0"/>
+            </a:p>
+          </p:txBody>
+        </p:sp>
+        <p:sp>
+          <p:nvSpPr>
+            <p:cNvPr id="76" name="テキスト ボックス 75">
+              <a:extLst>
+                <a:ext uri="{FF2B5EF4-FFF2-40B4-BE49-F238E27FC236}">
+                  <a16:creationId xmlns:a16="http://schemas.microsoft.com/office/drawing/2014/main" id="{7B95DADA-3902-466A-8C31-37D68F4E4D9D}"/>
+                </a:ext>
+              </a:extLst>
+            </p:cNvPr>
+            <p:cNvSpPr txBox="1"/>
+            <p:nvPr/>
+          </p:nvSpPr>
+          <p:spPr>
+            <a:xfrm>
+              <a:off x="5698658" y="4356764"/>
+              <a:ext cx="1043876" cy="523220"/>
+            </a:xfrm>
+            <a:prstGeom prst="rect">
+              <a:avLst/>
+            </a:prstGeom>
+            <a:noFill/>
+          </p:spPr>
+          <p:txBody>
+            <a:bodyPr wrap="none" rtlCol="0">
+              <a:spAutoFit/>
+            </a:bodyPr>
+            <a:lstStyle/>
+            <a:p>
+              <a:r>
+                <a:rPr kumimoji="1" lang="en-US" altLang="ja-JP" sz="1400" dirty="0"/>
+                <a:t>OSS +</a:t>
+              </a:r>
+            </a:p>
+            <a:p>
+              <a:r>
+                <a:rPr kumimoji="1" lang="en-US" altLang="ja-JP" sz="1400" dirty="0"/>
+                <a:t>OSS</a:t>
+              </a:r>
+              <a:r>
+                <a:rPr kumimoji="1" lang="ja-JP" altLang="en-US" sz="1400" dirty="0"/>
+                <a:t> </a:t>
+              </a:r>
+              <a:r>
+                <a:rPr kumimoji="1" lang="en-US" altLang="ja-JP" sz="1400" dirty="0"/>
+                <a:t>License</a:t>
+              </a:r>
+              <a:endParaRPr kumimoji="1" lang="ja-JP" altLang="en-US" sz="1400" dirty="0"/>
+            </a:p>
+          </p:txBody>
+        </p:sp>
+      </p:grpSp>
+    </p:spTree>
+    <p:extLst>
+      <p:ext uri="{BB962C8B-B14F-4D97-AF65-F5344CB8AC3E}">
+        <p14:creationId xmlns:p14="http://schemas.microsoft.com/office/powerpoint/2010/main" val="1855917365"/>
+      </p:ext>
+    </p:extLst>
+  </p:cSld>
+  <p:clrMapOvr>
+    <a:masterClrMapping/>
+  </p:clrMapOvr>
+</p:sld>
+</file>
+
+<file path=ppt/slides/slide3.xml><?xml version="1.0" encoding="utf-8"?>
 <p:sld xmlns:a="http://schemas.openxmlformats.org/drawingml/2006/main" xmlns:r="http://schemas.openxmlformats.org/officeDocument/2006/relationships" xmlns:p="http://schemas.openxmlformats.org/presentationml/2006/main">
   <p:cSld>
     <p:spTree>

</xml_diff>